<commit_message>
How to extend exisiting Actor
</commit_message>
<xml_diff>
--- a/Documentation/NI Actor Framework -DIMActor.pptx
+++ b/Documentation/NI Actor Framework -DIMActor.pptx
@@ -5,7 +5,7 @@
     <p:sldMasterId id="2147483648" r:id="rId1"/>
   </p:sldMasterIdLst>
   <p:notesMasterIdLst>
-    <p:notesMasterId r:id="rId20"/>
+    <p:notesMasterId r:id="rId21"/>
   </p:notesMasterIdLst>
   <p:sldIdLst>
     <p:sldId id="256" r:id="rId2"/>
@@ -25,7 +25,8 @@
     <p:sldId id="270" r:id="rId16"/>
     <p:sldId id="271" r:id="rId17"/>
     <p:sldId id="272" r:id="rId18"/>
-    <p:sldId id="264" r:id="rId19"/>
+    <p:sldId id="274" r:id="rId19"/>
+    <p:sldId id="264" r:id="rId20"/>
   </p:sldIdLst>
   <p:sldSz cx="9144000" cy="6858000" type="screen4x3"/>
   <p:notesSz cx="6858000" cy="9144000"/>
@@ -209,7 +210,7 @@
           <a:p>
             <a:fld id="{BAB46D27-B0DF-4E98-85C6-8BD5834E4FC4}" type="datetimeFigureOut">
               <a:rPr lang="de-DE" smtClean="0"/>
-              <a:t>19.02.2013</a:t>
+              <a:t>20.02.2013</a:t>
             </a:fld>
             <a:endParaRPr lang="de-DE"/>
           </a:p>
@@ -704,7 +705,7 @@
             <a:fld id="{B418CCE3-ADF8-4D6E-B263-90E85820EC44}" type="datetime1">
               <a:rPr lang="de-DE" smtClean="0"/>
               <a:pPr/>
-              <a:t>19.02.2013</a:t>
+              <a:t>20.02.2013</a:t>
             </a:fld>
             <a:endParaRPr lang="de-DE" dirty="0"/>
           </a:p>
@@ -900,7 +901,7 @@
           <a:p>
             <a:fld id="{BB834E4F-0125-4AD2-8584-167B6DA5606F}" type="datetime1">
               <a:rPr lang="de-DE" smtClean="0"/>
-              <a:t>19.02.2013</a:t>
+              <a:t>20.02.2013</a:t>
             </a:fld>
             <a:endParaRPr lang="de-DE"/>
           </a:p>
@@ -1080,7 +1081,7 @@
           <a:p>
             <a:fld id="{91968600-0E23-484E-9747-10E22BA18989}" type="datetime1">
               <a:rPr lang="de-DE" smtClean="0"/>
-              <a:t>19.02.2013</a:t>
+              <a:t>20.02.2013</a:t>
             </a:fld>
             <a:endParaRPr lang="de-DE"/>
           </a:p>
@@ -1271,7 +1272,7 @@
           <a:p>
             <a:fld id="{0FC658A1-4302-42C8-B31D-D1430F6AE143}" type="datetime1">
               <a:rPr lang="de-DE" smtClean="0"/>
-              <a:t>19.02.2013</a:t>
+              <a:t>20.02.2013</a:t>
             </a:fld>
             <a:endParaRPr lang="de-DE"/>
           </a:p>
@@ -1524,7 +1525,7 @@
           <a:p>
             <a:fld id="{1B6924CB-05FB-4179-B2D0-92DB10EA4650}" type="datetime1">
               <a:rPr lang="de-DE" smtClean="0"/>
-              <a:t>19.02.2013</a:t>
+              <a:t>20.02.2013</a:t>
             </a:fld>
             <a:endParaRPr lang="de-DE"/>
           </a:p>
@@ -1812,7 +1813,7 @@
           <a:p>
             <a:fld id="{66514710-0C99-4DBD-B4EA-4EE375B296BE}" type="datetime1">
               <a:rPr lang="de-DE" smtClean="0"/>
-              <a:t>19.02.2013</a:t>
+              <a:t>20.02.2013</a:t>
             </a:fld>
             <a:endParaRPr lang="de-DE"/>
           </a:p>
@@ -2234,7 +2235,7 @@
           <a:p>
             <a:fld id="{D5C6EF29-F2FB-47AB-A486-8D1D28D3E553}" type="datetime1">
               <a:rPr lang="de-DE" smtClean="0"/>
-              <a:t>19.02.2013</a:t>
+              <a:t>20.02.2013</a:t>
             </a:fld>
             <a:endParaRPr lang="de-DE"/>
           </a:p>
@@ -2352,7 +2353,7 @@
           <a:p>
             <a:fld id="{5FAF90F6-3F8D-49C7-A37A-0A1651CD0B0C}" type="datetime1">
               <a:rPr lang="de-DE" smtClean="0"/>
-              <a:t>19.02.2013</a:t>
+              <a:t>20.02.2013</a:t>
             </a:fld>
             <a:endParaRPr lang="de-DE"/>
           </a:p>
@@ -2447,7 +2448,7 @@
           <a:p>
             <a:fld id="{95F7F587-CFED-4FD5-B3AD-083C2065DE82}" type="datetime1">
               <a:rPr lang="de-DE" smtClean="0"/>
-              <a:t>19.02.2013</a:t>
+              <a:t>20.02.2013</a:t>
             </a:fld>
             <a:endParaRPr lang="de-DE"/>
           </a:p>
@@ -2724,7 +2725,7 @@
           <a:p>
             <a:fld id="{8A4B2867-F109-4833-817E-D342D1CD7196}" type="datetime1">
               <a:rPr lang="de-DE" smtClean="0"/>
-              <a:t>19.02.2013</a:t>
+              <a:t>20.02.2013</a:t>
             </a:fld>
             <a:endParaRPr lang="de-DE"/>
           </a:p>
@@ -2981,7 +2982,7 @@
           <a:p>
             <a:fld id="{66CE27EE-5B06-4FE1-A707-B61678AF74C0}" type="datetime1">
               <a:rPr lang="de-DE" smtClean="0"/>
-              <a:t>19.02.2013</a:t>
+              <a:t>20.02.2013</a:t>
             </a:fld>
             <a:endParaRPr lang="de-DE"/>
           </a:p>
@@ -3224,7 +3225,7 @@
           <a:p>
             <a:fld id="{81FF7C9C-F712-412E-9DE7-744EF926ADAF}" type="datetime1">
               <a:rPr lang="de-DE" smtClean="0"/>
-              <a:t>19.02.2013</a:t>
+              <a:t>20.02.2013</a:t>
             </a:fld>
             <a:endParaRPr lang="de-DE" dirty="0"/>
           </a:p>
@@ -3738,30 +3739,10 @@
           <a:lstStyle/>
           <a:p>
             <a:r>
-              <a:rPr lang="de-DE" dirty="0" err="1" smtClean="0"/>
-              <a:t>Introduction</a:t>
-            </a:r>
-            <a:r>
-              <a:rPr lang="de-DE" dirty="0" smtClean="0"/>
-              <a:t> </a:t>
-            </a:r>
-            <a:r>
-              <a:rPr lang="de-DE" dirty="0" err="1" smtClean="0"/>
-              <a:t>to</a:t>
-            </a:r>
-            <a:r>
-              <a:rPr lang="de-DE" dirty="0" smtClean="0"/>
-              <a:t> NI </a:t>
-            </a:r>
-            <a:r>
-              <a:rPr lang="de-DE" dirty="0" err="1" smtClean="0"/>
-              <a:t>Actor</a:t>
-            </a:r>
-            <a:r>
-              <a:rPr lang="de-DE" dirty="0" smtClean="0"/>
-              <a:t> Framework</a:t>
-            </a:r>
-            <a:endParaRPr lang="de-DE" dirty="0"/>
+              <a:rPr lang="en-US" dirty="0" smtClean="0"/>
+              <a:t>Introduction to NI Actor Framework</a:t>
+            </a:r>
+            <a:endParaRPr lang="en-US" dirty="0"/>
           </a:p>
         </p:txBody>
       </p:sp>
@@ -3781,48 +3762,20 @@
           <a:lstStyle/>
           <a:p>
             <a:r>
-              <a:rPr lang="de-DE" dirty="0" err="1" smtClean="0"/>
-              <a:t>How</a:t>
-            </a:r>
-            <a:r>
-              <a:rPr lang="de-DE" dirty="0" smtClean="0"/>
-              <a:t> </a:t>
-            </a:r>
-            <a:r>
-              <a:rPr lang="de-DE" dirty="0" err="1" smtClean="0"/>
-              <a:t>to</a:t>
-            </a:r>
-            <a:r>
-              <a:rPr lang="de-DE" dirty="0" smtClean="0"/>
-              <a:t> </a:t>
-            </a:r>
-            <a:r>
-              <a:rPr lang="de-DE" dirty="0" err="1" smtClean="0"/>
-              <a:t>integrate</a:t>
-            </a:r>
-            <a:r>
-              <a:rPr lang="de-DE" dirty="0" smtClean="0"/>
-              <a:t> DIM?</a:t>
-            </a:r>
-          </a:p>
-          <a:p>
-            <a:r>
-              <a:rPr lang="de-DE" dirty="0" err="1" smtClean="0"/>
+              <a:rPr lang="en-US" dirty="0" smtClean="0"/>
+              <a:t>How to integrate DIM?</a:t>
+            </a:r>
+          </a:p>
+          <a:p>
+            <a:r>
+              <a:rPr lang="en-US" dirty="0" err="1" smtClean="0"/>
               <a:t>DIMActor</a:t>
             </a:r>
             <a:r>
-              <a:rPr lang="de-DE" dirty="0" smtClean="0"/>
-              <a:t> </a:t>
-            </a:r>
-            <a:r>
-              <a:rPr lang="de-DE" dirty="0" err="1" smtClean="0"/>
-              <a:t>Anchestor</a:t>
-            </a:r>
-            <a:r>
-              <a:rPr lang="de-DE" dirty="0" smtClean="0"/>
-              <a:t> Class</a:t>
-            </a:r>
-            <a:endParaRPr lang="de-DE" dirty="0"/>
+              <a:rPr lang="en-US" dirty="0" smtClean="0"/>
+              <a:t> Ancestor Class</a:t>
+            </a:r>
+            <a:endParaRPr lang="en-US" dirty="0"/>
           </a:p>
         </p:txBody>
       </p:sp>
@@ -3879,29 +3832,201 @@
           <a:lstStyle/>
           <a:p>
             <a:r>
-              <a:rPr lang="de-DE" dirty="0" err="1" smtClean="0"/>
+              <a:rPr lang="en-US" dirty="0" err="1" smtClean="0"/>
               <a:t>DIMActor</a:t>
             </a:r>
             <a:r>
-              <a:rPr lang="de-DE" dirty="0" smtClean="0"/>
-              <a:t> – Project &amp; Class </a:t>
-            </a:r>
-            <a:r>
-              <a:rPr lang="de-DE" dirty="0" err="1" smtClean="0"/>
-              <a:t>Hierarchy</a:t>
-            </a:r>
+              <a:rPr lang="en-US" dirty="0" smtClean="0"/>
+              <a:t> – Project &amp; Class Hierarchy</a:t>
+            </a:r>
+            <a:endParaRPr lang="en-US" dirty="0"/>
+          </a:p>
+        </p:txBody>
+      </p:sp>
+      <p:sp>
+        <p:nvSpPr>
+          <p:cNvPr id="9" name="Inhaltsplatzhalter 8"/>
+          <p:cNvSpPr>
+            <a:spLocks noGrp="1"/>
+          </p:cNvSpPr>
+          <p:nvPr>
+            <p:ph idx="1"/>
+          </p:nvPr>
+        </p:nvSpPr>
+        <p:spPr/>
+        <p:txBody>
+          <a:bodyPr/>
+          <a:lstStyle/>
+          <a:p>
+            <a:pPr marL="342900" indent="-342900">
+              <a:buFont typeface="Arial" pitchFamily="34" charset="0"/>
+              <a:buChar char="•"/>
+            </a:pPr>
+            <a:r>
+              <a:rPr lang="en-US" b="1" dirty="0" err="1" smtClean="0"/>
+              <a:t>DIMActor.lvlib</a:t>
+            </a:r>
+            <a:r>
+              <a:rPr lang="en-US" dirty="0" smtClean="0"/>
+              <a:t> contains</a:t>
+            </a:r>
+          </a:p>
+          <a:p>
+            <a:pPr marL="800100" lvl="1" indent="-342900">
+              <a:buFont typeface="Arial" pitchFamily="34" charset="0"/>
+              <a:buChar char="•"/>
+            </a:pPr>
+            <a:r>
+              <a:rPr lang="en-US" i="1" dirty="0" err="1" smtClean="0"/>
+              <a:t>DIMActor.lvclass</a:t>
+            </a:r>
+            <a:r>
+              <a:rPr lang="en-US" dirty="0" smtClean="0"/>
+              <a:t> derived from </a:t>
+            </a:r>
+            <a:r>
+              <a:rPr lang="en-US" i="1" dirty="0" err="1" smtClean="0"/>
+              <a:t>Actor.lvclass</a:t>
+            </a:r>
+            <a:endParaRPr lang="en-US" i="1" dirty="0" smtClean="0"/>
+          </a:p>
+          <a:p>
+            <a:pPr marL="800100" lvl="1" indent="-342900">
+              <a:buFont typeface="Arial" pitchFamily="34" charset="0"/>
+              <a:buChar char="•"/>
+            </a:pPr>
+            <a:r>
+              <a:rPr lang="en-US" dirty="0" err="1" smtClean="0"/>
+              <a:t>DIMActor</a:t>
+            </a:r>
+            <a:r>
+              <a:rPr lang="en-US" dirty="0" smtClean="0"/>
+              <a:t> Messages</a:t>
+            </a:r>
+          </a:p>
+          <a:p>
+            <a:pPr marL="342900" indent="-342900">
+              <a:buFont typeface="Arial" pitchFamily="34" charset="0"/>
+              <a:buChar char="•"/>
+            </a:pPr>
+            <a:r>
+              <a:rPr lang="en-US" b="1" dirty="0" err="1" smtClean="0"/>
+              <a:t>DIMActorDemo.lvlib</a:t>
+            </a:r>
+            <a:r>
+              <a:rPr lang="en-US" dirty="0" smtClean="0"/>
+              <a:t> contains</a:t>
+            </a:r>
+          </a:p>
+          <a:p>
+            <a:pPr marL="800100" lvl="1" indent="-342900">
+              <a:buFont typeface="Arial" pitchFamily="34" charset="0"/>
+              <a:buChar char="•"/>
+            </a:pPr>
+            <a:r>
+              <a:rPr lang="en-US" dirty="0" smtClean="0"/>
+              <a:t>Server</a:t>
+            </a:r>
+          </a:p>
+          <a:p>
+            <a:pPr marL="1257300" lvl="2" indent="-342900">
+              <a:buFont typeface="Arial" pitchFamily="34" charset="0"/>
+              <a:buChar char="•"/>
+            </a:pPr>
+            <a:r>
+              <a:rPr lang="en-US" i="1" dirty="0" err="1" smtClean="0"/>
+              <a:t>DIMDemoServer.lvclas</a:t>
+            </a:r>
+            <a:r>
+              <a:rPr lang="en-US" dirty="0" err="1" smtClean="0"/>
+              <a:t>s</a:t>
+            </a:r>
+            <a:r>
+              <a:rPr lang="en-US" dirty="0" smtClean="0"/>
+              <a:t> derived from </a:t>
+            </a:r>
+            <a:r>
+              <a:rPr lang="en-US" i="1" dirty="0" err="1" smtClean="0"/>
+              <a:t>DIMActor.lvclass</a:t>
+            </a:r>
+            <a:endParaRPr lang="en-US" i="1" dirty="0" smtClean="0"/>
+          </a:p>
+          <a:p>
+            <a:pPr marL="1257300" lvl="2" indent="-342900">
+              <a:buFont typeface="Arial" pitchFamily="34" charset="0"/>
+              <a:buChar char="•"/>
+            </a:pPr>
+            <a:r>
+              <a:rPr lang="en-US" dirty="0" smtClean="0"/>
+              <a:t>Server Messages</a:t>
+            </a:r>
+          </a:p>
+          <a:p>
+            <a:pPr marL="800100" lvl="1" indent="-342900">
+              <a:buFont typeface="Arial" pitchFamily="34" charset="0"/>
+              <a:buChar char="•"/>
+            </a:pPr>
+            <a:r>
+              <a:rPr lang="en-US" dirty="0" smtClean="0"/>
+              <a:t>Client</a:t>
+            </a:r>
+          </a:p>
+          <a:p>
+            <a:pPr marL="1257300" lvl="2" indent="-342900">
+              <a:buFont typeface="Arial" pitchFamily="34" charset="0"/>
+              <a:buChar char="•"/>
+            </a:pPr>
+            <a:r>
+              <a:rPr lang="en-US" i="1" dirty="0" err="1" smtClean="0"/>
+              <a:t>DIMDemoClient.lvclass</a:t>
+            </a:r>
+            <a:r>
+              <a:rPr lang="en-US" dirty="0" smtClean="0"/>
+              <a:t> derived from </a:t>
+            </a:r>
+            <a:r>
+              <a:rPr lang="en-US" i="1" dirty="0" err="1" smtClean="0"/>
+              <a:t>DIMActor.lvclass</a:t>
+            </a:r>
+            <a:endParaRPr lang="en-US" i="1" dirty="0" smtClean="0"/>
+          </a:p>
+          <a:p>
+            <a:pPr marL="1257300" lvl="2" indent="-342900">
+              <a:buFont typeface="Arial" pitchFamily="34" charset="0"/>
+              <a:buChar char="•"/>
+            </a:pPr>
+            <a:r>
+              <a:rPr lang="en-US" dirty="0" smtClean="0"/>
+              <a:t>Client Messages</a:t>
+            </a:r>
+          </a:p>
+          <a:p>
+            <a:pPr marL="800100" lvl="1" indent="-342900">
+              <a:buFont typeface="Arial" pitchFamily="34" charset="0"/>
+              <a:buChar char="•"/>
+            </a:pPr>
+            <a:r>
+              <a:rPr lang="en-US" dirty="0" smtClean="0"/>
+              <a:t>Application: Test.vi</a:t>
+            </a:r>
+          </a:p>
+          <a:p>
+            <a:pPr marL="800100" lvl="1" indent="-342900">
+              <a:buFont typeface="Arial" pitchFamily="34" charset="0"/>
+              <a:buChar char="•"/>
+            </a:pPr>
             <a:endParaRPr lang="de-DE" dirty="0"/>
           </a:p>
         </p:txBody>
       </p:sp>
       <p:sp>
         <p:nvSpPr>
-          <p:cNvPr id="9" name="Inhaltsplatzhalter 8"/>
-          <p:cNvSpPr>
-            <a:spLocks noGrp="1"/>
-          </p:cNvSpPr>
-          <p:nvPr>
-            <p:ph idx="1"/>
+          <p:cNvPr id="5" name="Datumsplatzhalter 4"/>
+          <p:cNvSpPr>
+            <a:spLocks noGrp="1"/>
+          </p:cNvSpPr>
+          <p:nvPr>
+            <p:ph type="dt" sz="half" idx="10"/>
           </p:nvPr>
         </p:nvSpPr>
         <p:spPr/>
@@ -3909,247 +4034,9 @@
           <a:bodyPr/>
           <a:lstStyle/>
           <a:p>
-            <a:pPr marL="342900" indent="-342900">
-              <a:buFont typeface="Arial" pitchFamily="34" charset="0"/>
-              <a:buChar char="•"/>
-            </a:pPr>
-            <a:r>
-              <a:rPr lang="de-DE" b="1" dirty="0" err="1" smtClean="0"/>
-              <a:t>DIMActor.lvlib</a:t>
-            </a:r>
-            <a:r>
-              <a:rPr lang="de-DE" dirty="0" smtClean="0"/>
-              <a:t> </a:t>
-            </a:r>
-            <a:r>
-              <a:rPr lang="de-DE" dirty="0" err="1" smtClean="0"/>
-              <a:t>contains</a:t>
-            </a:r>
-            <a:endParaRPr lang="de-DE" dirty="0" smtClean="0"/>
-          </a:p>
-          <a:p>
-            <a:pPr marL="800100" lvl="1" indent="-342900">
-              <a:buFont typeface="Arial" pitchFamily="34" charset="0"/>
-              <a:buChar char="•"/>
-            </a:pPr>
-            <a:r>
-              <a:rPr lang="de-DE" i="1" dirty="0" err="1" smtClean="0"/>
-              <a:t>DIMActor.lvclass</a:t>
-            </a:r>
-            <a:r>
-              <a:rPr lang="de-DE" dirty="0" smtClean="0"/>
-              <a:t> </a:t>
-            </a:r>
-            <a:r>
-              <a:rPr lang="de-DE" dirty="0" err="1" smtClean="0"/>
-              <a:t>derived</a:t>
-            </a:r>
-            <a:r>
-              <a:rPr lang="de-DE" dirty="0" smtClean="0"/>
-              <a:t> </a:t>
-            </a:r>
-            <a:r>
-              <a:rPr lang="de-DE" dirty="0" err="1" smtClean="0"/>
-              <a:t>from</a:t>
-            </a:r>
-            <a:r>
-              <a:rPr lang="de-DE" dirty="0" smtClean="0"/>
-              <a:t> </a:t>
-            </a:r>
-            <a:r>
-              <a:rPr lang="de-DE" i="1" dirty="0" err="1" smtClean="0"/>
-              <a:t>Actor.lvclass</a:t>
-            </a:r>
-            <a:endParaRPr lang="de-DE" i="1" dirty="0" smtClean="0"/>
-          </a:p>
-          <a:p>
-            <a:pPr marL="800100" lvl="1" indent="-342900">
-              <a:buFont typeface="Arial" pitchFamily="34" charset="0"/>
-              <a:buChar char="•"/>
-            </a:pPr>
-            <a:r>
-              <a:rPr lang="de-DE" dirty="0" err="1" smtClean="0"/>
-              <a:t>DIMActor</a:t>
-            </a:r>
-            <a:r>
-              <a:rPr lang="de-DE" dirty="0" smtClean="0"/>
-              <a:t> Messages</a:t>
-            </a:r>
-          </a:p>
-          <a:p>
-            <a:pPr marL="342900" indent="-342900">
-              <a:buFont typeface="Arial" pitchFamily="34" charset="0"/>
-              <a:buChar char="•"/>
-            </a:pPr>
-            <a:r>
-              <a:rPr lang="de-DE" b="1" dirty="0" err="1" smtClean="0"/>
-              <a:t>DIMActorDemo.lvlib</a:t>
-            </a:r>
-            <a:r>
-              <a:rPr lang="de-DE" dirty="0" smtClean="0"/>
-              <a:t> </a:t>
-            </a:r>
-            <a:r>
-              <a:rPr lang="de-DE" dirty="0" err="1" smtClean="0"/>
-              <a:t>contains</a:t>
-            </a:r>
-            <a:endParaRPr lang="de-DE" dirty="0" smtClean="0"/>
-          </a:p>
-          <a:p>
-            <a:pPr marL="800100" lvl="1" indent="-342900">
-              <a:buFont typeface="Arial" pitchFamily="34" charset="0"/>
-              <a:buChar char="•"/>
-            </a:pPr>
-            <a:r>
-              <a:rPr lang="de-DE" dirty="0" smtClean="0"/>
-              <a:t>Server</a:t>
-            </a:r>
-          </a:p>
-          <a:p>
-            <a:pPr marL="1257300" lvl="2" indent="-342900">
-              <a:buFont typeface="Arial" pitchFamily="34" charset="0"/>
-              <a:buChar char="•"/>
-            </a:pPr>
-            <a:r>
-              <a:rPr lang="de-DE" i="1" dirty="0" err="1" smtClean="0"/>
-              <a:t>DIMDemoServer.lvclas</a:t>
-            </a:r>
-            <a:r>
-              <a:rPr lang="de-DE" dirty="0" err="1" smtClean="0"/>
-              <a:t>s</a:t>
-            </a:r>
-            <a:r>
-              <a:rPr lang="de-DE" dirty="0" smtClean="0"/>
-              <a:t> </a:t>
-            </a:r>
-            <a:r>
-              <a:rPr lang="de-DE" dirty="0" err="1" smtClean="0"/>
-              <a:t>derived</a:t>
-            </a:r>
-            <a:r>
-              <a:rPr lang="de-DE" dirty="0" smtClean="0"/>
-              <a:t> </a:t>
-            </a:r>
-            <a:r>
-              <a:rPr lang="de-DE" dirty="0" err="1" smtClean="0"/>
-              <a:t>from</a:t>
-            </a:r>
-            <a:r>
-              <a:rPr lang="de-DE" dirty="0" smtClean="0"/>
-              <a:t> </a:t>
-            </a:r>
-            <a:r>
-              <a:rPr lang="de-DE" i="1" dirty="0" err="1" smtClean="0"/>
-              <a:t>DIMActor.lvclass</a:t>
-            </a:r>
-            <a:endParaRPr lang="de-DE" i="1" dirty="0"/>
-          </a:p>
-          <a:p>
-            <a:pPr marL="1257300" lvl="2" indent="-342900">
-              <a:buFont typeface="Arial" pitchFamily="34" charset="0"/>
-              <a:buChar char="•"/>
-            </a:pPr>
-            <a:r>
-              <a:rPr lang="de-DE" dirty="0" smtClean="0"/>
-              <a:t>Server Messages</a:t>
-            </a:r>
-          </a:p>
-          <a:p>
-            <a:pPr marL="800100" lvl="1" indent="-342900">
-              <a:buFont typeface="Arial" pitchFamily="34" charset="0"/>
-              <a:buChar char="•"/>
-            </a:pPr>
-            <a:r>
-              <a:rPr lang="de-DE" dirty="0" smtClean="0"/>
-              <a:t>Client</a:t>
-            </a:r>
-          </a:p>
-          <a:p>
-            <a:pPr marL="1257300" lvl="2" indent="-342900">
-              <a:buFont typeface="Arial" pitchFamily="34" charset="0"/>
-              <a:buChar char="•"/>
-            </a:pPr>
-            <a:r>
-              <a:rPr lang="de-DE" i="1" dirty="0" err="1" smtClean="0"/>
-              <a:t>DIMDemoClient.lvclass</a:t>
-            </a:r>
-            <a:r>
-              <a:rPr lang="de-DE" dirty="0" smtClean="0"/>
-              <a:t> </a:t>
-            </a:r>
-            <a:r>
-              <a:rPr lang="de-DE" dirty="0" err="1"/>
-              <a:t>derived</a:t>
-            </a:r>
-            <a:r>
-              <a:rPr lang="de-DE" dirty="0"/>
-              <a:t> </a:t>
-            </a:r>
-            <a:r>
-              <a:rPr lang="de-DE" dirty="0" err="1"/>
-              <a:t>from</a:t>
-            </a:r>
-            <a:r>
-              <a:rPr lang="de-DE" dirty="0"/>
-              <a:t> </a:t>
-            </a:r>
-            <a:r>
-              <a:rPr lang="de-DE" i="1" dirty="0" err="1"/>
-              <a:t>DIMActor.lvclass</a:t>
-            </a:r>
-            <a:endParaRPr lang="de-DE" i="1" dirty="0"/>
-          </a:p>
-          <a:p>
-            <a:pPr marL="1257300" lvl="2" indent="-342900">
-              <a:buFont typeface="Arial" pitchFamily="34" charset="0"/>
-              <a:buChar char="•"/>
-            </a:pPr>
-            <a:r>
-              <a:rPr lang="de-DE" dirty="0" smtClean="0"/>
-              <a:t>Client Messages</a:t>
-            </a:r>
-          </a:p>
-          <a:p>
-            <a:pPr marL="800100" lvl="1" indent="-342900">
-              <a:buFont typeface="Arial" pitchFamily="34" charset="0"/>
-              <a:buChar char="•"/>
-            </a:pPr>
-            <a:r>
-              <a:rPr lang="de-DE" dirty="0" err="1" smtClean="0"/>
-              <a:t>Application</a:t>
-            </a:r>
-            <a:r>
-              <a:rPr lang="de-DE" dirty="0" smtClean="0"/>
-              <a:t>: Test.vi</a:t>
-            </a:r>
-          </a:p>
-          <a:p>
-            <a:pPr marL="800100" lvl="1" indent="-342900">
-              <a:buFont typeface="Arial" pitchFamily="34" charset="0"/>
-              <a:buChar char="•"/>
-            </a:pPr>
-            <a:endParaRPr lang="de-DE" dirty="0"/>
-          </a:p>
-        </p:txBody>
-      </p:sp>
-      <p:sp>
-        <p:nvSpPr>
-          <p:cNvPr id="5" name="Datumsplatzhalter 4"/>
-          <p:cNvSpPr>
-            <a:spLocks noGrp="1"/>
-          </p:cNvSpPr>
-          <p:nvPr>
-            <p:ph type="dt" sz="half" idx="10"/>
-          </p:nvPr>
-        </p:nvSpPr>
-        <p:spPr/>
-        <p:txBody>
-          <a:bodyPr/>
-          <a:lstStyle/>
-          <a:p>
             <a:fld id="{66514710-0C99-4DBD-B4EA-4EE375B296BE}" type="datetime1">
               <a:rPr lang="de-DE" smtClean="0"/>
-              <a:t>19.02.2013</a:t>
+              <a:t>20.02.2013</a:t>
             </a:fld>
             <a:endParaRPr lang="de-DE"/>
           </a:p>
@@ -4532,94 +4419,66 @@
               <a:buChar char="•"/>
             </a:pPr>
             <a:r>
-              <a:rPr lang="de-DE" sz="2000" dirty="0" smtClean="0"/>
+              <a:rPr lang="en-US" sz="2000" dirty="0" smtClean="0"/>
               <a:t>Initialize </a:t>
             </a:r>
             <a:r>
-              <a:rPr lang="de-DE" sz="2000" i="1" dirty="0" err="1" smtClean="0"/>
-              <a:t>Caller</a:t>
-            </a:r>
-            <a:r>
-              <a:rPr lang="de-DE" sz="2000" i="1" dirty="0" smtClean="0"/>
-              <a:t> </a:t>
-            </a:r>
-            <a:r>
-              <a:rPr lang="de-DE" sz="2000" i="1" dirty="0" err="1" smtClean="0"/>
-              <a:t>to</a:t>
-            </a:r>
-            <a:r>
-              <a:rPr lang="de-DE" sz="2000" i="1" dirty="0"/>
-              <a:t> </a:t>
-            </a:r>
-            <a:r>
-              <a:rPr lang="de-DE" sz="2000" i="1" dirty="0" err="1" smtClean="0"/>
+              <a:rPr lang="en-US" sz="2000" i="1" dirty="0" smtClean="0"/>
+              <a:t>Caller to Actor Queue</a:t>
+            </a:r>
+          </a:p>
+          <a:p>
+            <a:pPr marL="342900" indent="-342900">
+              <a:buFont typeface="Arial" pitchFamily="34" charset="0"/>
+              <a:buChar char="•"/>
+            </a:pPr>
+            <a:r>
+              <a:rPr lang="en-US" sz="2000" dirty="0" smtClean="0"/>
+              <a:t>Initialize </a:t>
+            </a:r>
+            <a:r>
+              <a:rPr lang="en-US" sz="2000" i="1" dirty="0" err="1" smtClean="0"/>
+              <a:t>DIMDemoServer</a:t>
+            </a:r>
+            <a:endParaRPr lang="en-US" sz="2000" i="1" dirty="0" smtClean="0"/>
+          </a:p>
+          <a:p>
+            <a:pPr marL="342900" indent="-342900">
+              <a:buFont typeface="Arial" pitchFamily="34" charset="0"/>
+              <a:buChar char="•"/>
+            </a:pPr>
+            <a:r>
+              <a:rPr lang="en-US" sz="2000" dirty="0" smtClean="0"/>
+              <a:t>Initialize two </a:t>
+            </a:r>
+            <a:r>
+              <a:rPr lang="en-US" sz="2000" i="1" dirty="0" err="1" smtClean="0"/>
+              <a:t>DIMDemoClient</a:t>
+            </a:r>
+            <a:r>
+              <a:rPr lang="en-US" sz="2000" dirty="0" err="1" smtClean="0"/>
+              <a:t>s</a:t>
+            </a:r>
+            <a:endParaRPr lang="en-US" sz="2000" dirty="0" smtClean="0"/>
+          </a:p>
+          <a:p>
+            <a:pPr marL="342900" indent="-342900">
+              <a:buFont typeface="Arial" pitchFamily="34" charset="0"/>
+              <a:buChar char="•"/>
+            </a:pPr>
+            <a:r>
+              <a:rPr lang="en-US" sz="2000" dirty="0" smtClean="0"/>
+              <a:t>Launch </a:t>
+            </a:r>
+            <a:r>
+              <a:rPr lang="en-US" sz="2000" i="1" dirty="0" smtClean="0"/>
               <a:t>Actor</a:t>
             </a:r>
             <a:r>
-              <a:rPr lang="de-DE" sz="2000" i="1" dirty="0" smtClean="0"/>
-              <a:t> Queue</a:t>
-            </a:r>
-          </a:p>
-          <a:p>
-            <a:pPr marL="342900" indent="-342900">
-              <a:buFont typeface="Arial" pitchFamily="34" charset="0"/>
-              <a:buChar char="•"/>
-            </a:pPr>
-            <a:r>
-              <a:rPr lang="de-DE" sz="2000" dirty="0" smtClean="0"/>
-              <a:t>Initialize </a:t>
-            </a:r>
-            <a:r>
-              <a:rPr lang="de-DE" sz="2000" i="1" dirty="0" err="1" smtClean="0"/>
-              <a:t>DIMDemoServer</a:t>
-            </a:r>
-            <a:endParaRPr lang="de-DE" sz="2000" i="1" dirty="0" smtClean="0"/>
-          </a:p>
-          <a:p>
-            <a:pPr marL="342900" indent="-342900">
-              <a:buFont typeface="Arial" pitchFamily="34" charset="0"/>
-              <a:buChar char="•"/>
-            </a:pPr>
-            <a:r>
-              <a:rPr lang="de-DE" sz="2000" dirty="0" smtClean="0"/>
-              <a:t>Initialize </a:t>
-            </a:r>
-            <a:r>
-              <a:rPr lang="de-DE" sz="2000" dirty="0" err="1" smtClean="0"/>
-              <a:t>two</a:t>
-            </a:r>
-            <a:r>
-              <a:rPr lang="de-DE" sz="2000" dirty="0" smtClean="0"/>
-              <a:t> </a:t>
-            </a:r>
-            <a:r>
-              <a:rPr lang="de-DE" sz="2000" i="1" dirty="0" err="1" smtClean="0"/>
-              <a:t>DIMDemoClient</a:t>
-            </a:r>
-            <a:r>
-              <a:rPr lang="de-DE" sz="2000" dirty="0" err="1" smtClean="0"/>
+              <a:rPr lang="en-US" sz="2000" dirty="0" smtClean="0"/>
               <a:t>s</a:t>
             </a:r>
-            <a:endParaRPr lang="de-DE" sz="2000" dirty="0" smtClean="0"/>
-          </a:p>
-          <a:p>
-            <a:pPr marL="342900" indent="-342900">
-              <a:buFont typeface="Arial" pitchFamily="34" charset="0"/>
-              <a:buChar char="•"/>
-            </a:pPr>
-            <a:r>
-              <a:rPr lang="de-DE" sz="2000" dirty="0" smtClean="0"/>
-              <a:t>Launch </a:t>
-            </a:r>
-            <a:r>
-              <a:rPr lang="de-DE" sz="2000" i="1" dirty="0" err="1" smtClean="0"/>
-              <a:t>Actor</a:t>
-            </a:r>
-            <a:r>
-              <a:rPr lang="de-DE" sz="2000" dirty="0" err="1" smtClean="0"/>
-              <a:t>s</a:t>
-            </a:r>
-            <a:endParaRPr lang="de-DE" sz="2000" dirty="0"/>
+            <a:endParaRPr lang="en-US" sz="2000" dirty="0"/>
           </a:p>
         </p:txBody>
       </p:sp>
@@ -4650,26 +4509,9 @@
               <a:buChar char="•"/>
             </a:pPr>
             <a:r>
-              <a:rPr lang="de-DE" sz="2000" dirty="0" err="1" smtClean="0"/>
-              <a:t>Wait</a:t>
-            </a:r>
-            <a:r>
-              <a:rPr lang="de-DE" sz="2000" dirty="0" smtClean="0"/>
-              <a:t> </a:t>
-            </a:r>
-            <a:r>
-              <a:rPr lang="de-DE" sz="2000" dirty="0" err="1" smtClean="0"/>
-              <a:t>for</a:t>
-            </a:r>
-            <a:r>
-              <a:rPr lang="de-DE" sz="2000" dirty="0" smtClean="0"/>
-              <a:t> </a:t>
-            </a:r>
-            <a:r>
-              <a:rPr lang="de-DE" sz="2000" dirty="0" err="1" smtClean="0"/>
-              <a:t>Stop</a:t>
-            </a:r>
-            <a:endParaRPr lang="de-DE" sz="2000" dirty="0" smtClean="0"/>
+              <a:rPr lang="en-US" sz="2000" dirty="0" smtClean="0"/>
+              <a:t>Wait for Stop</a:t>
+            </a:r>
           </a:p>
           <a:p>
             <a:pPr marL="457200" indent="-457200">
@@ -4677,23 +4519,15 @@
               <a:buChar char="•"/>
             </a:pPr>
             <a:r>
-              <a:rPr lang="de-DE" sz="2000" dirty="0" err="1" smtClean="0"/>
-              <a:t>Sent</a:t>
-            </a:r>
-            <a:r>
-              <a:rPr lang="de-DE" sz="2000" dirty="0" smtClean="0"/>
-              <a:t> </a:t>
-            </a:r>
-            <a:r>
-              <a:rPr lang="de-DE" sz="2000" i="1" dirty="0" err="1" smtClean="0"/>
-              <a:t>Stop</a:t>
-            </a:r>
-            <a:r>
-              <a:rPr lang="de-DE" sz="2000" i="1" dirty="0" smtClean="0"/>
-              <a:t>-Message</a:t>
-            </a:r>
-            <a:r>
-              <a:rPr lang="de-DE" sz="2000" dirty="0" smtClean="0"/>
+              <a:rPr lang="en-US" sz="2000" dirty="0" smtClean="0"/>
+              <a:t>Sent </a:t>
+            </a:r>
+            <a:r>
+              <a:rPr lang="en-US" sz="2000" i="1" dirty="0" smtClean="0"/>
+              <a:t>Stop-Message</a:t>
+            </a:r>
+            <a:r>
+              <a:rPr lang="en-US" sz="2000" dirty="0" smtClean="0"/>
               <a:t>s</a:t>
             </a:r>
           </a:p>
@@ -4703,10 +4537,10 @@
               <a:buChar char="•"/>
             </a:pPr>
             <a:r>
-              <a:rPr lang="de-DE" sz="2000" dirty="0" smtClean="0"/>
+              <a:rPr lang="en-US" sz="2000" dirty="0" smtClean="0"/>
               <a:t>Report Error</a:t>
             </a:r>
-            <a:endParaRPr lang="de-DE" sz="2000" dirty="0"/>
+            <a:endParaRPr lang="en-US" sz="2000" dirty="0"/>
           </a:p>
         </p:txBody>
       </p:sp>
@@ -4727,7 +4561,7 @@
           <a:p>
             <a:fld id="{0FC658A1-4302-42C8-B31D-D1430F6AE143}" type="datetime1">
               <a:rPr lang="de-DE" smtClean="0"/>
-              <a:t>19.02.2013</a:t>
+              <a:t>20.02.2013</a:t>
             </a:fld>
             <a:endParaRPr lang="de-DE"/>
           </a:p>
@@ -4863,7 +4697,7 @@
           <a:p>
             <a:fld id="{66514710-0C99-4DBD-B4EA-4EE375B296BE}" type="datetime1">
               <a:rPr lang="de-DE" smtClean="0"/>
-              <a:t>19.02.2013</a:t>
+              <a:t>20.02.2013</a:t>
             </a:fld>
             <a:endParaRPr lang="de-DE"/>
           </a:p>
@@ -5159,26 +4993,14 @@
           <a:lstStyle/>
           <a:p>
             <a:r>
-              <a:rPr lang="de-DE" dirty="0" err="1" smtClean="0"/>
+              <a:rPr lang="en-US" dirty="0" err="1" smtClean="0"/>
               <a:t>DIMActor</a:t>
             </a:r>
             <a:r>
-              <a:rPr lang="de-DE" dirty="0" smtClean="0"/>
-              <a:t> – </a:t>
-            </a:r>
-            <a:r>
-              <a:rPr lang="de-DE" dirty="0" err="1" smtClean="0"/>
-              <a:t>Overwrite</a:t>
-            </a:r>
-            <a:r>
-              <a:rPr lang="de-DE" dirty="0" smtClean="0"/>
-              <a:t> </a:t>
-            </a:r>
-            <a:r>
-              <a:rPr lang="de-DE" dirty="0" err="1" smtClean="0"/>
-              <a:t>VI‘s</a:t>
-            </a:r>
-            <a:endParaRPr lang="de-DE" dirty="0"/>
+              <a:rPr lang="en-US" dirty="0" smtClean="0"/>
+              <a:t> – Overwrite VI‘s</a:t>
+            </a:r>
+            <a:endParaRPr lang="en-US" dirty="0"/>
           </a:p>
         </p:txBody>
       </p:sp>
@@ -5199,7 +5021,7 @@
           <a:p>
             <a:fld id="{5FAF90F6-3F8D-49C7-A37A-0A1651CD0B0C}" type="datetime1">
               <a:rPr lang="de-DE" smtClean="0"/>
-              <a:t>19.02.2013</a:t>
+              <a:t>20.02.2013</a:t>
             </a:fld>
             <a:endParaRPr lang="de-DE"/>
           </a:p>
@@ -5412,14 +5234,10 @@
           <a:lstStyle/>
           <a:p>
             <a:r>
-              <a:rPr lang="de-DE" dirty="0" err="1" smtClean="0"/>
-              <a:t>Stop</a:t>
-            </a:r>
-            <a:r>
-              <a:rPr lang="de-DE" dirty="0" smtClean="0"/>
-              <a:t> Core.vi</a:t>
-            </a:r>
-            <a:endParaRPr lang="de-DE" dirty="0"/>
+              <a:rPr lang="en-US" dirty="0" smtClean="0"/>
+              <a:t>Stop Core.vi</a:t>
+            </a:r>
+            <a:endParaRPr lang="en-US" dirty="0"/>
           </a:p>
         </p:txBody>
       </p:sp>
@@ -5446,14 +5264,10 @@
           <a:lstStyle/>
           <a:p>
             <a:r>
-              <a:rPr lang="de-DE" dirty="0" err="1" smtClean="0"/>
-              <a:t>Pre</a:t>
-            </a:r>
-            <a:r>
-              <a:rPr lang="de-DE" dirty="0" smtClean="0"/>
-              <a:t> Launch Core.vi</a:t>
-            </a:r>
-            <a:endParaRPr lang="de-DE" dirty="0"/>
+              <a:rPr lang="en-US" dirty="0" smtClean="0"/>
+              <a:t>Pre Launch Core.vi</a:t>
+            </a:r>
+            <a:endParaRPr lang="en-US" dirty="0"/>
           </a:p>
         </p:txBody>
       </p:sp>
@@ -5534,20 +5348,12 @@
           <a:lstStyle/>
           <a:p>
             <a:r>
-              <a:rPr lang="de-DE" dirty="0" err="1" smtClean="0"/>
-              <a:t>Dynamich</a:t>
-            </a:r>
-            <a:r>
-              <a:rPr lang="de-DE" dirty="0" smtClean="0"/>
-              <a:t> </a:t>
-            </a:r>
-            <a:r>
-              <a:rPr lang="de-DE" dirty="0" err="1" smtClean="0"/>
-              <a:t>Dispatch</a:t>
-            </a:r>
-            <a:r>
-              <a:rPr lang="de-DE" dirty="0" smtClean="0"/>
-              <a:t>-VI:</a:t>
+              <a:rPr lang="en-US" dirty="0" smtClean="0"/>
+              <a:t>Dynamic </a:t>
+            </a:r>
+            <a:r>
+              <a:rPr lang="en-US" dirty="0" smtClean="0"/>
+              <a:t>Dispatch-VI:</a:t>
             </a:r>
           </a:p>
           <a:p>
@@ -5678,26 +5484,14 @@
           <a:lstStyle/>
           <a:p>
             <a:r>
-              <a:rPr lang="de-DE" dirty="0" err="1"/>
+              <a:rPr lang="en-US" dirty="0" err="1" smtClean="0"/>
               <a:t>DIMActor</a:t>
             </a:r>
             <a:r>
-              <a:rPr lang="de-DE" dirty="0"/>
-              <a:t> – </a:t>
-            </a:r>
-            <a:r>
-              <a:rPr lang="de-DE" dirty="0" smtClean="0"/>
-              <a:t>Dynamic </a:t>
-            </a:r>
-            <a:r>
-              <a:rPr lang="de-DE" dirty="0" err="1" smtClean="0"/>
-              <a:t>Dispatch</a:t>
-            </a:r>
-            <a:r>
-              <a:rPr lang="de-DE" dirty="0" smtClean="0"/>
-              <a:t> VI</a:t>
-            </a:r>
-            <a:endParaRPr lang="de-DE" dirty="0"/>
+              <a:rPr lang="en-US" dirty="0" smtClean="0"/>
+              <a:t> – Dynamic Dispatch VI</a:t>
+            </a:r>
+            <a:endParaRPr lang="en-US" dirty="0"/>
           </a:p>
         </p:txBody>
       </p:sp>
@@ -5718,7 +5512,7 @@
           <a:p>
             <a:fld id="{5FAF90F6-3F8D-49C7-A37A-0A1651CD0B0C}" type="datetime1">
               <a:rPr lang="de-DE" smtClean="0"/>
-              <a:t>19.02.2013</a:t>
+              <a:t>20.02.2013</a:t>
             </a:fld>
             <a:endParaRPr lang="de-DE"/>
           </a:p>
@@ -5862,20 +5656,8 @@
             <a:lstStyle/>
             <a:p>
               <a:r>
-                <a:rPr lang="de-DE" dirty="0" err="1" smtClean="0"/>
-                <a:t>Dynamich</a:t>
-              </a:r>
-              <a:r>
-                <a:rPr lang="de-DE" dirty="0" smtClean="0"/>
-                <a:t> </a:t>
-              </a:r>
-              <a:r>
-                <a:rPr lang="de-DE" dirty="0" err="1" smtClean="0"/>
-                <a:t>Dispatch</a:t>
-              </a:r>
-              <a:r>
-                <a:rPr lang="de-DE" dirty="0" smtClean="0"/>
-                <a:t>-VI:</a:t>
+                <a:rPr lang="en-US" dirty="0" smtClean="0"/>
+                <a:t>Dynamic Dispatch-VI:</a:t>
               </a:r>
             </a:p>
             <a:p>
@@ -5965,7 +5747,7 @@
           <p:spPr>
             <a:xfrm>
               <a:off x="2627784" y="3284984"/>
-              <a:ext cx="3647152" cy="646331"/>
+              <a:ext cx="3736985" cy="646331"/>
             </a:xfrm>
             <a:prstGeom prst="rect">
               <a:avLst/>
@@ -5985,7 +5767,15 @@
             <a:p>
               <a:r>
                 <a:rPr lang="de-DE" dirty="0" err="1" smtClean="0"/>
-                <a:t>DIMDEmoServer.lvclass</a:t>
+                <a:t>Example</a:t>
+              </a:r>
+              <a:r>
+                <a:rPr lang="de-DE" dirty="0" smtClean="0"/>
+                <a:t> </a:t>
+              </a:r>
+              <a:r>
+                <a:rPr lang="de-DE" dirty="0" err="1" smtClean="0"/>
+                <a:t>DIMDemoServer.lvclass</a:t>
               </a:r>
               <a:r>
                 <a:rPr lang="de-DE" dirty="0" smtClean="0"/>
@@ -6191,7 +5981,7 @@
           <a:p>
             <a:fld id="{5FAF90F6-3F8D-49C7-A37A-0A1651CD0B0C}" type="datetime1">
               <a:rPr lang="de-DE" smtClean="0"/>
-              <a:t>19.02.2013</a:t>
+              <a:t>20.02.2013</a:t>
             </a:fld>
             <a:endParaRPr lang="de-DE"/>
           </a:p>
@@ -6508,14 +6298,10 @@
           <a:lstStyle/>
           <a:p>
             <a:r>
-              <a:rPr lang="de-DE" dirty="0" smtClean="0"/>
-              <a:t>Start </a:t>
-            </a:r>
-            <a:r>
-              <a:rPr lang="de-DE" dirty="0" err="1" smtClean="0"/>
-              <a:t>Serving</a:t>
-            </a:r>
-            <a:endParaRPr lang="de-DE" dirty="0"/>
+              <a:rPr lang="en-US" dirty="0" smtClean="0"/>
+              <a:t>Start Serving</a:t>
+            </a:r>
+            <a:endParaRPr lang="en-US" dirty="0"/>
           </a:p>
         </p:txBody>
       </p:sp>
@@ -6606,10 +6392,10 @@
               <a:t>Add </a:t>
             </a:r>
             <a:r>
-              <a:rPr lang="de-DE" dirty="0" err="1" smtClean="0"/>
+              <a:rPr lang="en-US" dirty="0" smtClean="0"/>
               <a:t>Subscription</a:t>
             </a:r>
-            <a:endParaRPr lang="de-DE" dirty="0"/>
+            <a:endParaRPr lang="en-US" dirty="0"/>
           </a:p>
         </p:txBody>
       </p:sp>
@@ -6724,7 +6510,7 @@
           <a:p>
             <a:fld id="{5FAF90F6-3F8D-49C7-A37A-0A1651CD0B0C}" type="datetime1">
               <a:rPr lang="de-DE" smtClean="0"/>
-              <a:t>19.02.2013</a:t>
+              <a:t>20.02.2013</a:t>
             </a:fld>
             <a:endParaRPr lang="de-DE"/>
           </a:p>
@@ -7314,7 +7100,7 @@
           <a:p>
             <a:fld id="{5FAF90F6-3F8D-49C7-A37A-0A1651CD0B0C}" type="datetime1">
               <a:rPr lang="de-DE" smtClean="0"/>
-              <a:t>19.02.2013</a:t>
+              <a:t>20.02.2013</a:t>
             </a:fld>
             <a:endParaRPr lang="de-DE"/>
           </a:p>
@@ -8083,6 +7869,505 @@
           <a:chExt cx="0" cy="0"/>
         </a:xfrm>
       </p:grpSpPr>
+      <p:pic>
+        <p:nvPicPr>
+          <p:cNvPr id="9" name="Picture 4"/>
+          <p:cNvPicPr>
+            <a:picLocks noChangeAspect="1" noChangeArrowheads="1"/>
+          </p:cNvPicPr>
+          <p:nvPr/>
+        </p:nvPicPr>
+        <p:blipFill>
+          <a:blip r:embed="rId2" cstate="print">
+            <a:extLst>
+              <a:ext uri="{28A0092B-C50C-407E-A947-70E740481C1C}">
+                <a14:useLocalDpi xmlns:a14="http://schemas.microsoft.com/office/drawing/2010/main" val="0"/>
+              </a:ext>
+            </a:extLst>
+          </a:blip>
+          <a:srcRect/>
+          <a:stretch>
+            <a:fillRect/>
+          </a:stretch>
+        </p:blipFill>
+        <p:spPr bwMode="auto">
+          <a:xfrm>
+            <a:off x="6300192" y="3284984"/>
+            <a:ext cx="2839789" cy="941211"/>
+          </a:xfrm>
+          <a:prstGeom prst="rect">
+            <a:avLst/>
+          </a:prstGeom>
+          <a:noFill/>
+          <a:ln>
+            <a:noFill/>
+          </a:ln>
+          <a:extLst>
+            <a:ext uri="{909E8E84-426E-40DD-AFC4-6F175D3DCCD1}">
+              <a14:hiddenFill xmlns:a14="http://schemas.microsoft.com/office/drawing/2010/main">
+                <a:solidFill>
+                  <a:schemeClr val="accent1"/>
+                </a:solidFill>
+              </a14:hiddenFill>
+            </a:ext>
+            <a:ext uri="{91240B29-F687-4F45-9708-019B960494DF}">
+              <a14:hiddenLine xmlns:a14="http://schemas.microsoft.com/office/drawing/2010/main" w="9525">
+                <a:solidFill>
+                  <a:schemeClr val="tx1"/>
+                </a:solidFill>
+                <a:miter lim="800000"/>
+                <a:headEnd/>
+                <a:tailEnd/>
+              </a14:hiddenLine>
+            </a:ext>
+          </a:extLst>
+        </p:spPr>
+      </p:pic>
+      <p:pic>
+        <p:nvPicPr>
+          <p:cNvPr id="8" name="Picture 2"/>
+          <p:cNvPicPr>
+            <a:picLocks noChangeAspect="1" noChangeArrowheads="1"/>
+          </p:cNvPicPr>
+          <p:nvPr/>
+        </p:nvPicPr>
+        <p:blipFill>
+          <a:blip r:embed="rId3">
+            <a:extLst>
+              <a:ext uri="{28A0092B-C50C-407E-A947-70E740481C1C}">
+                <a14:useLocalDpi xmlns:a14="http://schemas.microsoft.com/office/drawing/2010/main" val="0"/>
+              </a:ext>
+            </a:extLst>
+          </a:blip>
+          <a:srcRect/>
+          <a:stretch>
+            <a:fillRect/>
+          </a:stretch>
+        </p:blipFill>
+        <p:spPr bwMode="auto">
+          <a:xfrm>
+            <a:off x="4714552" y="2204864"/>
+            <a:ext cx="4393952" cy="994723"/>
+          </a:xfrm>
+          <a:prstGeom prst="rect">
+            <a:avLst/>
+          </a:prstGeom>
+          <a:noFill/>
+          <a:ln>
+            <a:noFill/>
+          </a:ln>
+          <a:extLst>
+            <a:ext uri="{909E8E84-426E-40DD-AFC4-6F175D3DCCD1}">
+              <a14:hiddenFill xmlns:a14="http://schemas.microsoft.com/office/drawing/2010/main">
+                <a:solidFill>
+                  <a:schemeClr val="accent1"/>
+                </a:solidFill>
+              </a14:hiddenFill>
+            </a:ext>
+            <a:ext uri="{91240B29-F687-4F45-9708-019B960494DF}">
+              <a14:hiddenLine xmlns:a14="http://schemas.microsoft.com/office/drawing/2010/main" w="9525">
+                <a:solidFill>
+                  <a:schemeClr val="tx1"/>
+                </a:solidFill>
+                <a:miter lim="800000"/>
+                <a:headEnd/>
+                <a:tailEnd/>
+              </a14:hiddenLine>
+            </a:ext>
+          </a:extLst>
+        </p:spPr>
+      </p:pic>
+      <p:sp>
+        <p:nvSpPr>
+          <p:cNvPr id="6" name="Titel 5"/>
+          <p:cNvSpPr>
+            <a:spLocks noGrp="1"/>
+          </p:cNvSpPr>
+          <p:nvPr>
+            <p:ph type="title"/>
+          </p:nvPr>
+        </p:nvSpPr>
+        <p:spPr/>
+        <p:txBody>
+          <a:bodyPr/>
+          <a:lstStyle/>
+          <a:p>
+            <a:r>
+              <a:rPr lang="en-US" dirty="0" smtClean="0"/>
+              <a:t>Extending existing Actors to use DIM</a:t>
+            </a:r>
+            <a:endParaRPr lang="en-US" dirty="0"/>
+          </a:p>
+        </p:txBody>
+      </p:sp>
+      <p:sp>
+        <p:nvSpPr>
+          <p:cNvPr id="7" name="Inhaltsplatzhalter 6"/>
+          <p:cNvSpPr>
+            <a:spLocks noGrp="1"/>
+          </p:cNvSpPr>
+          <p:nvPr>
+            <p:ph idx="1"/>
+          </p:nvPr>
+        </p:nvSpPr>
+        <p:spPr>
+          <a:xfrm>
+            <a:off x="223283" y="1340768"/>
+            <a:ext cx="8237149" cy="4932441"/>
+          </a:xfrm>
+        </p:spPr>
+        <p:txBody>
+          <a:bodyPr>
+            <a:normAutofit/>
+          </a:bodyPr>
+          <a:lstStyle/>
+          <a:p>
+            <a:pPr marL="342900" indent="-342900">
+              <a:buFont typeface="Arial" pitchFamily="34" charset="0"/>
+              <a:buChar char="•"/>
+            </a:pPr>
+            <a:r>
+              <a:rPr lang="en-US" dirty="0" smtClean="0"/>
+              <a:t>Inherit from </a:t>
+            </a:r>
+            <a:r>
+              <a:rPr lang="en-US" i="1" dirty="0" err="1" smtClean="0"/>
+              <a:t>DIMActor.lvclass</a:t>
+            </a:r>
+            <a:r>
+              <a:rPr lang="en-US" dirty="0" smtClean="0"/>
+              <a:t> instead of </a:t>
+            </a:r>
+            <a:r>
+              <a:rPr lang="en-US" i="1" dirty="0" err="1" smtClean="0"/>
+              <a:t>Actor.lvclass</a:t>
+            </a:r>
+            <a:endParaRPr lang="en-US" i="1" dirty="0" smtClean="0"/>
+          </a:p>
+          <a:p>
+            <a:pPr marL="342900" indent="-342900">
+              <a:buFont typeface="Arial" pitchFamily="34" charset="0"/>
+              <a:buChar char="•"/>
+            </a:pPr>
+            <a:r>
+              <a:rPr lang="en-US" dirty="0" smtClean="0"/>
+              <a:t>Extend </a:t>
+            </a:r>
+            <a:r>
+              <a:rPr lang="en-US" i="1" dirty="0" smtClean="0"/>
+              <a:t>Actor Core.vi</a:t>
+            </a:r>
+            <a:r>
+              <a:rPr lang="en-US" dirty="0" smtClean="0"/>
+              <a:t> to add</a:t>
+            </a:r>
+          </a:p>
+          <a:p>
+            <a:pPr marL="800100" lvl="1" indent="-342900">
+              <a:buFont typeface="Arial" pitchFamily="34" charset="0"/>
+              <a:buChar char="•"/>
+            </a:pPr>
+            <a:r>
+              <a:rPr lang="en-US" i="1" dirty="0" smtClean="0"/>
+              <a:t>Commands</a:t>
+            </a:r>
+          </a:p>
+          <a:p>
+            <a:pPr marL="800100" lvl="1" indent="-342900">
+              <a:buFont typeface="Arial" pitchFamily="34" charset="0"/>
+              <a:buChar char="•"/>
+            </a:pPr>
+            <a:r>
+              <a:rPr lang="en-US" i="1" dirty="0" smtClean="0"/>
+              <a:t>Services</a:t>
+            </a:r>
+          </a:p>
+          <a:p>
+            <a:pPr marL="800100" lvl="1" indent="-342900">
+              <a:buFont typeface="Arial" pitchFamily="34" charset="0"/>
+              <a:buChar char="•"/>
+            </a:pPr>
+            <a:r>
+              <a:rPr lang="en-US" i="1" dirty="0" smtClean="0"/>
+              <a:t>Subscriptions</a:t>
+            </a:r>
+          </a:p>
+          <a:p>
+            <a:pPr marL="342900" indent="-342900">
+              <a:buFont typeface="Arial" pitchFamily="34" charset="0"/>
+              <a:buChar char="•"/>
+            </a:pPr>
+            <a:r>
+              <a:rPr lang="en-US" dirty="0" smtClean="0"/>
+              <a:t>Overwrite: </a:t>
+            </a:r>
+            <a:r>
+              <a:rPr lang="en-US" i="1" dirty="0" smtClean="0"/>
+              <a:t>CastByteArrayAndDispatchMsg.vi</a:t>
+            </a:r>
+          </a:p>
+          <a:p>
+            <a:pPr marL="800100" lvl="1" indent="-342900">
+              <a:buFont typeface="Arial" pitchFamily="34" charset="0"/>
+              <a:buChar char="•"/>
+            </a:pPr>
+            <a:r>
+              <a:rPr lang="en-US" dirty="0" smtClean="0"/>
+              <a:t>For each </a:t>
+            </a:r>
+            <a:r>
+              <a:rPr lang="en-US" i="1" dirty="0" smtClean="0"/>
+              <a:t>Command </a:t>
+            </a:r>
+            <a:r>
+              <a:rPr lang="en-US" dirty="0" smtClean="0"/>
+              <a:t>and</a:t>
+            </a:r>
+            <a:r>
+              <a:rPr lang="en-US" i="1" dirty="0" smtClean="0"/>
+              <a:t> Subscription</a:t>
+            </a:r>
+          </a:p>
+          <a:p>
+            <a:pPr marL="1257300" lvl="2" indent="-342900">
+              <a:buFont typeface="Arial" pitchFamily="34" charset="0"/>
+              <a:buChar char="•"/>
+            </a:pPr>
+            <a:r>
+              <a:rPr lang="en-US" dirty="0" smtClean="0"/>
+              <a:t>Typecast DIM byte-array to expected G data type</a:t>
+            </a:r>
+          </a:p>
+          <a:p>
+            <a:pPr marL="1257300" lvl="2" indent="-342900">
+              <a:buFont typeface="Arial" pitchFamily="34" charset="0"/>
+              <a:buChar char="•"/>
+            </a:pPr>
+            <a:r>
+              <a:rPr lang="en-US" dirty="0" smtClean="0"/>
+              <a:t>Send corresponding (already existing) Message to self.</a:t>
+            </a:r>
+          </a:p>
+          <a:p>
+            <a:pPr marL="342900" indent="-342900">
+              <a:buFont typeface="Arial" pitchFamily="34" charset="0"/>
+              <a:buChar char="•"/>
+            </a:pPr>
+            <a:r>
+              <a:rPr lang="en-US" dirty="0" smtClean="0"/>
+              <a:t>Publish </a:t>
+            </a:r>
+            <a:r>
+              <a:rPr lang="en-US" i="1" dirty="0" smtClean="0"/>
+              <a:t>Service</a:t>
+            </a:r>
+            <a:r>
+              <a:rPr lang="en-US" dirty="0" smtClean="0"/>
+              <a:t> data where necessary.</a:t>
+            </a:r>
+          </a:p>
+          <a:p>
+            <a:pPr marL="342900" indent="-342900">
+              <a:buFont typeface="Arial" pitchFamily="34" charset="0"/>
+              <a:buChar char="•"/>
+            </a:pPr>
+            <a:endParaRPr lang="en-US" dirty="0" smtClean="0"/>
+          </a:p>
+          <a:p>
+            <a:pPr marL="342900" indent="-342900">
+              <a:buFont typeface="Arial" pitchFamily="34" charset="0"/>
+              <a:buChar char="•"/>
+            </a:pPr>
+            <a:r>
+              <a:rPr lang="en-US" dirty="0" smtClean="0"/>
+              <a:t>Use </a:t>
+            </a:r>
+            <a:r>
+              <a:rPr lang="en-US" i="1" dirty="0" smtClean="0"/>
+              <a:t>CoreLib.CallProcess.vi</a:t>
+            </a:r>
+            <a:r>
+              <a:rPr lang="en-US" dirty="0" smtClean="0"/>
+              <a:t> to send</a:t>
+            </a:r>
+            <a:br>
+              <a:rPr lang="en-US" dirty="0" smtClean="0"/>
+            </a:br>
+            <a:r>
+              <a:rPr lang="en-US" dirty="0" smtClean="0"/>
+              <a:t>Messages to </a:t>
+            </a:r>
+            <a:r>
+              <a:rPr lang="en-US" i="1" dirty="0" smtClean="0"/>
+              <a:t>CS</a:t>
+            </a:r>
+            <a:r>
+              <a:rPr lang="en-US" dirty="0" smtClean="0"/>
+              <a:t>-Objects</a:t>
+            </a:r>
+            <a:endParaRPr lang="en-US" dirty="0" smtClean="0"/>
+          </a:p>
+          <a:p>
+            <a:endParaRPr lang="en-US" dirty="0"/>
+          </a:p>
+        </p:txBody>
+      </p:sp>
+      <p:sp>
+        <p:nvSpPr>
+          <p:cNvPr id="3" name="Datumsplatzhalter 2"/>
+          <p:cNvSpPr>
+            <a:spLocks noGrp="1"/>
+          </p:cNvSpPr>
+          <p:nvPr>
+            <p:ph type="dt" sz="half" idx="10"/>
+          </p:nvPr>
+        </p:nvSpPr>
+        <p:spPr/>
+        <p:txBody>
+          <a:bodyPr/>
+          <a:lstStyle/>
+          <a:p>
+            <a:fld id="{5FAF90F6-3F8D-49C7-A37A-0A1651CD0B0C}" type="datetime1">
+              <a:rPr lang="de-DE" smtClean="0"/>
+              <a:t>20.02.2013</a:t>
+            </a:fld>
+            <a:endParaRPr lang="de-DE"/>
+          </a:p>
+        </p:txBody>
+      </p:sp>
+      <p:sp>
+        <p:nvSpPr>
+          <p:cNvPr id="4" name="Fußzeilenplatzhalter 3"/>
+          <p:cNvSpPr>
+            <a:spLocks noGrp="1"/>
+          </p:cNvSpPr>
+          <p:nvPr>
+            <p:ph type="ftr" sz="quarter" idx="11"/>
+          </p:nvPr>
+        </p:nvSpPr>
+        <p:spPr/>
+        <p:txBody>
+          <a:bodyPr/>
+          <a:lstStyle/>
+          <a:p>
+            <a:endParaRPr lang="de-DE"/>
+          </a:p>
+        </p:txBody>
+      </p:sp>
+      <p:sp>
+        <p:nvSpPr>
+          <p:cNvPr id="5" name="Foliennummernplatzhalter 4"/>
+          <p:cNvSpPr>
+            <a:spLocks noGrp="1"/>
+          </p:cNvSpPr>
+          <p:nvPr>
+            <p:ph type="sldNum" sz="quarter" idx="12"/>
+          </p:nvPr>
+        </p:nvSpPr>
+        <p:spPr/>
+        <p:txBody>
+          <a:bodyPr/>
+          <a:lstStyle/>
+          <a:p>
+            <a:fld id="{614DD408-A132-4815-A232-DF74F09DA447}" type="slidenum">
+              <a:rPr lang="de-DE" smtClean="0"/>
+              <a:t>18</a:t>
+            </a:fld>
+            <a:endParaRPr lang="de-DE"/>
+          </a:p>
+        </p:txBody>
+      </p:sp>
+      <p:pic>
+        <p:nvPicPr>
+          <p:cNvPr id="10" name="Picture 3"/>
+          <p:cNvPicPr>
+            <a:picLocks noChangeAspect="1" noChangeArrowheads="1"/>
+          </p:cNvPicPr>
+          <p:nvPr/>
+        </p:nvPicPr>
+        <p:blipFill>
+          <a:blip r:embed="rId4">
+            <a:extLst>
+              <a:ext uri="{28A0092B-C50C-407E-A947-70E740481C1C}">
+                <a14:useLocalDpi xmlns:a14="http://schemas.microsoft.com/office/drawing/2010/main" val="0"/>
+              </a:ext>
+            </a:extLst>
+          </a:blip>
+          <a:srcRect/>
+          <a:stretch>
+            <a:fillRect/>
+          </a:stretch>
+        </p:blipFill>
+        <p:spPr bwMode="auto">
+          <a:xfrm>
+            <a:off x="5666336" y="4725144"/>
+            <a:ext cx="3442168" cy="966096"/>
+          </a:xfrm>
+          <a:prstGeom prst="rect">
+            <a:avLst/>
+          </a:prstGeom>
+          <a:noFill/>
+          <a:ln>
+            <a:noFill/>
+          </a:ln>
+          <a:extLst>
+            <a:ext uri="{909E8E84-426E-40DD-AFC4-6F175D3DCCD1}">
+              <a14:hiddenFill xmlns:a14="http://schemas.microsoft.com/office/drawing/2010/main">
+                <a:solidFill>
+                  <a:schemeClr val="accent1"/>
+                </a:solidFill>
+              </a14:hiddenFill>
+            </a:ext>
+            <a:ext uri="{91240B29-F687-4F45-9708-019B960494DF}">
+              <a14:hiddenLine xmlns:a14="http://schemas.microsoft.com/office/drawing/2010/main" w="9525">
+                <a:solidFill>
+                  <a:schemeClr val="tx1"/>
+                </a:solidFill>
+                <a:miter lim="800000"/>
+                <a:headEnd/>
+                <a:tailEnd/>
+              </a14:hiddenLine>
+            </a:ext>
+          </a:extLst>
+        </p:spPr>
+      </p:pic>
+    </p:spTree>
+    <p:extLst>
+      <p:ext uri="{BB962C8B-B14F-4D97-AF65-F5344CB8AC3E}">
+        <p14:creationId xmlns:p14="http://schemas.microsoft.com/office/powerpoint/2010/main" val="3395774434"/>
+      </p:ext>
+    </p:extLst>
+  </p:cSld>
+  <p:clrMapOvr>
+    <a:masterClrMapping/>
+  </p:clrMapOvr>
+  <p:timing>
+    <p:tnLst>
+      <p:par>
+        <p:cTn id="1" dur="indefinite" restart="never" nodeType="tmRoot"/>
+      </p:par>
+    </p:tnLst>
+  </p:timing>
+</p:sld>
+</file>
+
+<file path=ppt/slides/slide19.xml><?xml version="1.0" encoding="utf-8"?>
+<p:sld xmlns:a="http://schemas.openxmlformats.org/drawingml/2006/main" xmlns:r="http://schemas.openxmlformats.org/officeDocument/2006/relationships" xmlns:p="http://schemas.openxmlformats.org/presentationml/2006/main">
+  <p:cSld>
+    <p:spTree>
+      <p:nvGrpSpPr>
+        <p:cNvPr id="1" name=""/>
+        <p:cNvGrpSpPr/>
+        <p:nvPr/>
+      </p:nvGrpSpPr>
+      <p:grpSpPr>
+        <a:xfrm>
+          <a:off x="0" y="0"/>
+          <a:ext cx="0" cy="0"/>
+          <a:chOff x="0" y="0"/>
+          <a:chExt cx="0" cy="0"/>
+        </a:xfrm>
+      </p:grpSpPr>
       <p:sp>
         <p:nvSpPr>
           <p:cNvPr id="8" name="Titel 7"/>
@@ -8315,7 +8600,7 @@
           <a:p>
             <a:fld id="{66514710-0C99-4DBD-B4EA-4EE375B296BE}" type="datetime1">
               <a:rPr lang="de-DE" smtClean="0"/>
-              <a:t>19.02.2013</a:t>
+              <a:t>20.02.2013</a:t>
             </a:fld>
             <a:endParaRPr lang="de-DE"/>
           </a:p>
@@ -8357,7 +8642,7 @@
           <a:p>
             <a:fld id="{614DD408-A132-4815-A232-DF74F09DA447}" type="slidenum">
               <a:rPr lang="de-DE" smtClean="0"/>
-              <a:t>18</a:t>
+              <a:t>19</a:t>
             </a:fld>
             <a:endParaRPr lang="de-DE"/>
           </a:p>
@@ -8429,7 +8714,7 @@
         <p:spPr/>
         <p:txBody>
           <a:bodyPr>
-            <a:normAutofit lnSpcReduction="10000"/>
+            <a:normAutofit fontScale="92500" lnSpcReduction="10000"/>
           </a:bodyPr>
           <a:lstStyle/>
           <a:p>
@@ -8438,10 +8723,9 @@
               <a:buChar char="•"/>
             </a:pPr>
             <a:r>
-              <a:rPr lang="de-DE" dirty="0" err="1"/>
+              <a:rPr lang="en-US" dirty="0" smtClean="0"/>
               <a:t>Prerequisites</a:t>
             </a:r>
-            <a:endParaRPr lang="de-DE" dirty="0"/>
           </a:p>
           <a:p>
             <a:pPr marL="342900" indent="-342900">
@@ -8449,22 +8733,127 @@
               <a:buChar char="•"/>
             </a:pPr>
             <a:r>
-              <a:rPr lang="de-DE" dirty="0"/>
-              <a:t>Motivation: </a:t>
-            </a:r>
-            <a:r>
-              <a:rPr lang="de-DE" dirty="0" err="1"/>
-              <a:t>Active</a:t>
-            </a:r>
-            <a:r>
-              <a:rPr lang="de-DE" dirty="0"/>
+              <a:rPr lang="en-US" dirty="0" smtClean="0"/>
+              <a:t>Motivation: Active objects</a:t>
+            </a:r>
+          </a:p>
+          <a:p>
+            <a:pPr marL="342900" indent="-342900">
+              <a:buFont typeface="Arial" pitchFamily="34" charset="0"/>
+              <a:buChar char="•"/>
+            </a:pPr>
+            <a:r>
+              <a:rPr lang="en-US" dirty="0" smtClean="0"/>
+              <a:t>LVOOP</a:t>
+            </a:r>
+          </a:p>
+          <a:p>
+            <a:pPr marL="800100" lvl="1" indent="-342900">
+              <a:buFont typeface="Arial" pitchFamily="34" charset="0"/>
+              <a:buChar char="•"/>
+            </a:pPr>
+            <a:r>
+              <a:rPr lang="en-US" dirty="0" smtClean="0"/>
+              <a:t>Pros &amp; Cons</a:t>
+            </a:r>
+          </a:p>
+          <a:p>
+            <a:pPr marL="800100" lvl="1" indent="-342900">
+              <a:buFont typeface="Arial" pitchFamily="34" charset="0"/>
+              <a:buChar char="•"/>
+            </a:pPr>
+            <a:r>
+              <a:rPr lang="en-US" dirty="0" smtClean="0"/>
+              <a:t>Application</a:t>
+            </a:r>
+          </a:p>
+          <a:p>
+            <a:pPr marL="800100" lvl="1" indent="-342900">
+              <a:buFont typeface="Arial" pitchFamily="34" charset="0"/>
+              <a:buChar char="•"/>
+            </a:pPr>
+            <a:r>
+              <a:rPr lang="en-US" i="1" dirty="0" smtClean="0"/>
+              <a:t>NI Actor Framework</a:t>
+            </a:r>
+          </a:p>
+          <a:p>
+            <a:pPr marL="342900" indent="-342900">
+              <a:buFont typeface="Arial" pitchFamily="34" charset="0"/>
+              <a:buChar char="•"/>
+            </a:pPr>
+            <a:r>
+              <a:rPr lang="en-US" i="1" dirty="0" smtClean="0"/>
+              <a:t>DIM</a:t>
+            </a:r>
+          </a:p>
+          <a:p>
+            <a:pPr marL="342900" indent="-342900">
+              <a:buFont typeface="Arial" pitchFamily="34" charset="0"/>
+              <a:buChar char="•"/>
+            </a:pPr>
+            <a:r>
+              <a:rPr lang="en-US" dirty="0" smtClean="0"/>
+              <a:t>Example: </a:t>
+            </a:r>
+          </a:p>
+          <a:p>
+            <a:pPr marL="800100" lvl="1" indent="-342900">
+              <a:buFont typeface="Arial" pitchFamily="34" charset="0"/>
+              <a:buChar char="•"/>
+            </a:pPr>
+            <a:r>
+              <a:rPr lang="en-US" dirty="0" err="1" smtClean="0"/>
+              <a:t>DIMActor</a:t>
+            </a:r>
+            <a:r>
+              <a:rPr lang="en-US" dirty="0" smtClean="0"/>
               <a:t> </a:t>
             </a:r>
             <a:r>
-              <a:rPr lang="de-DE" dirty="0" err="1"/>
-              <a:t>objects</a:t>
-            </a:r>
-            <a:endParaRPr lang="de-DE" dirty="0"/>
+              <a:rPr lang="en-US" dirty="0" err="1" smtClean="0"/>
+              <a:t>anchestor</a:t>
+            </a:r>
+            <a:r>
+              <a:rPr lang="en-US" dirty="0" smtClean="0"/>
+              <a:t> class</a:t>
+            </a:r>
+          </a:p>
+          <a:p>
+            <a:pPr marL="800100" lvl="1" indent="-342900">
+              <a:buFont typeface="Arial" pitchFamily="34" charset="0"/>
+              <a:buChar char="•"/>
+            </a:pPr>
+            <a:r>
+              <a:rPr lang="en-US" dirty="0" err="1" smtClean="0"/>
+              <a:t>DIMActor</a:t>
+            </a:r>
+            <a:r>
+              <a:rPr lang="en-US" dirty="0" smtClean="0"/>
+              <a:t> derived classes</a:t>
+            </a:r>
+          </a:p>
+          <a:p>
+            <a:pPr marL="1257300" lvl="2" indent="-342900">
+              <a:buFont typeface="Arial" pitchFamily="34" charset="0"/>
+              <a:buChar char="•"/>
+            </a:pPr>
+            <a:r>
+              <a:rPr lang="en-US" dirty="0" err="1" smtClean="0"/>
+              <a:t>DIMDemoServer</a:t>
+            </a:r>
+            <a:endParaRPr lang="en-US" dirty="0" smtClean="0"/>
+          </a:p>
+          <a:p>
+            <a:pPr marL="1257300" lvl="2" indent="-342900">
+              <a:buFont typeface="Arial" pitchFamily="34" charset="0"/>
+              <a:buChar char="•"/>
+            </a:pPr>
+            <a:r>
+              <a:rPr lang="en-US" dirty="0" err="1" smtClean="0"/>
+              <a:t>DIMDemoClient</a:t>
+            </a:r>
+            <a:endParaRPr lang="en-US" dirty="0" smtClean="0"/>
           </a:p>
           <a:p>
             <a:pPr marL="342900" indent="-342900">
@@ -8472,159 +8861,9 @@
               <a:buChar char="•"/>
             </a:pPr>
             <a:r>
-              <a:rPr lang="de-DE" dirty="0"/>
-              <a:t>LVOOP</a:t>
-            </a:r>
-          </a:p>
-          <a:p>
-            <a:pPr marL="800100" lvl="1" indent="-342900">
-              <a:buFont typeface="Arial" pitchFamily="34" charset="0"/>
-              <a:buChar char="•"/>
-            </a:pPr>
-            <a:r>
-              <a:rPr lang="de-DE" dirty="0"/>
-              <a:t>Pros &amp; </a:t>
-            </a:r>
-            <a:r>
-              <a:rPr lang="de-DE" dirty="0" smtClean="0"/>
-              <a:t>Cons</a:t>
-            </a:r>
-            <a:endParaRPr lang="de-DE" dirty="0"/>
-          </a:p>
-          <a:p>
-            <a:pPr marL="800100" lvl="1" indent="-342900">
-              <a:buFont typeface="Arial" pitchFamily="34" charset="0"/>
-              <a:buChar char="•"/>
-            </a:pPr>
-            <a:r>
-              <a:rPr lang="de-DE" dirty="0" err="1"/>
-              <a:t>Application</a:t>
-            </a:r>
-            <a:endParaRPr lang="de-DE" dirty="0"/>
-          </a:p>
-          <a:p>
-            <a:pPr marL="800100" lvl="1" indent="-342900">
-              <a:buFont typeface="Arial" pitchFamily="34" charset="0"/>
-              <a:buChar char="•"/>
-            </a:pPr>
-            <a:r>
-              <a:rPr lang="de-DE" i="1" dirty="0"/>
-              <a:t>NI </a:t>
-            </a:r>
-            <a:r>
-              <a:rPr lang="de-DE" i="1" dirty="0" err="1"/>
-              <a:t>Actor</a:t>
-            </a:r>
-            <a:r>
-              <a:rPr lang="de-DE" i="1" dirty="0"/>
-              <a:t> </a:t>
-            </a:r>
-            <a:r>
-              <a:rPr lang="de-DE" i="1" dirty="0" smtClean="0"/>
-              <a:t>Framework</a:t>
-            </a:r>
-          </a:p>
-          <a:p>
-            <a:pPr marL="800100" lvl="1" indent="-342900">
-              <a:buFont typeface="Arial" pitchFamily="34" charset="0"/>
-              <a:buChar char="•"/>
-            </a:pPr>
-            <a:r>
-              <a:rPr lang="de-DE" i="1" dirty="0" smtClean="0"/>
-              <a:t>DIM</a:t>
-            </a:r>
-            <a:endParaRPr lang="de-DE" i="1" dirty="0"/>
-          </a:p>
-          <a:p>
-            <a:pPr marL="800100" lvl="1" indent="-342900">
-              <a:buFont typeface="Arial" pitchFamily="34" charset="0"/>
-              <a:buChar char="•"/>
-            </a:pPr>
-            <a:r>
-              <a:rPr lang="de-DE" dirty="0" err="1"/>
-              <a:t>Example</a:t>
-            </a:r>
-            <a:r>
-              <a:rPr lang="de-DE" dirty="0"/>
-              <a:t>: </a:t>
-            </a:r>
-            <a:endParaRPr lang="de-DE" dirty="0" smtClean="0"/>
-          </a:p>
-          <a:p>
-            <a:pPr marL="1257300" lvl="2" indent="-342900">
-              <a:buFont typeface="Arial" pitchFamily="34" charset="0"/>
-              <a:buChar char="•"/>
-            </a:pPr>
-            <a:r>
-              <a:rPr lang="de-DE" dirty="0" err="1" smtClean="0"/>
-              <a:t>DIMActor</a:t>
-            </a:r>
-            <a:r>
-              <a:rPr lang="de-DE" dirty="0" smtClean="0"/>
-              <a:t> </a:t>
-            </a:r>
-            <a:r>
-              <a:rPr lang="de-DE" dirty="0" err="1" smtClean="0"/>
-              <a:t>Anchestor</a:t>
-            </a:r>
-            <a:r>
-              <a:rPr lang="de-DE" dirty="0" smtClean="0"/>
-              <a:t> </a:t>
-            </a:r>
-            <a:r>
-              <a:rPr lang="de-DE" dirty="0" err="1" smtClean="0"/>
-              <a:t>class</a:t>
-            </a:r>
-            <a:endParaRPr lang="de-DE" dirty="0" smtClean="0"/>
-          </a:p>
-          <a:p>
-            <a:pPr marL="1257300" lvl="2" indent="-342900">
-              <a:buFont typeface="Arial" pitchFamily="34" charset="0"/>
-              <a:buChar char="•"/>
-            </a:pPr>
-            <a:r>
-              <a:rPr lang="de-DE" dirty="0" err="1" smtClean="0"/>
-              <a:t>DIMActor</a:t>
-            </a:r>
-            <a:r>
-              <a:rPr lang="de-DE" dirty="0" smtClean="0"/>
-              <a:t> </a:t>
-            </a:r>
-            <a:r>
-              <a:rPr lang="de-DE" dirty="0" err="1" smtClean="0"/>
-              <a:t>derived</a:t>
-            </a:r>
-            <a:r>
-              <a:rPr lang="de-DE" dirty="0" smtClean="0"/>
-              <a:t> </a:t>
-            </a:r>
-            <a:r>
-              <a:rPr lang="de-DE" dirty="0" err="1" smtClean="0"/>
-              <a:t>classes</a:t>
-            </a:r>
-            <a:endParaRPr lang="de-DE" dirty="0" smtClean="0"/>
-          </a:p>
-          <a:p>
-            <a:pPr marL="1714500" lvl="3" indent="-342900">
-              <a:buFont typeface="Arial" pitchFamily="34" charset="0"/>
-              <a:buChar char="•"/>
-            </a:pPr>
-            <a:r>
-              <a:rPr lang="de-DE" dirty="0" err="1" smtClean="0"/>
-              <a:t>DIMDemoServer</a:t>
-            </a:r>
-            <a:endParaRPr lang="de-DE" dirty="0" smtClean="0"/>
-          </a:p>
-          <a:p>
-            <a:pPr marL="1714500" lvl="3" indent="-342900">
-              <a:buFont typeface="Arial" pitchFamily="34" charset="0"/>
-              <a:buChar char="•"/>
-            </a:pPr>
-            <a:r>
-              <a:rPr lang="de-DE" dirty="0" err="1" smtClean="0"/>
-              <a:t>DIMDemoClient</a:t>
-            </a:r>
-            <a:endParaRPr lang="de-DE" dirty="0"/>
+              <a:rPr lang="en-US" dirty="0" smtClean="0"/>
+              <a:t>How to extend existing Actors?</a:t>
+            </a:r>
           </a:p>
           <a:p>
             <a:pPr marL="342900" indent="-342900">
@@ -8632,10 +8871,10 @@
               <a:buChar char="•"/>
             </a:pPr>
             <a:r>
-              <a:rPr lang="de-DE" smtClean="0"/>
+              <a:rPr lang="en-US" dirty="0" smtClean="0"/>
               <a:t>References</a:t>
             </a:r>
-            <a:endParaRPr lang="de-DE" dirty="0"/>
+            <a:endParaRPr lang="en-US" dirty="0"/>
           </a:p>
         </p:txBody>
       </p:sp>
@@ -8656,7 +8895,7 @@
           <a:p>
             <a:fld id="{0FC658A1-4302-42C8-B31D-D1430F6AE143}" type="datetime1">
               <a:rPr lang="de-DE" smtClean="0"/>
-              <a:t>19.02.2013</a:t>
+              <a:t>20.02.2013</a:t>
             </a:fld>
             <a:endParaRPr lang="de-DE"/>
           </a:p>
@@ -8882,7 +9121,7 @@
           <a:p>
             <a:fld id="{0FC658A1-4302-42C8-B31D-D1430F6AE143}" type="datetime1">
               <a:rPr lang="de-DE" smtClean="0"/>
-              <a:t>19.02.2013</a:t>
+              <a:t>20.02.2013</a:t>
             </a:fld>
             <a:endParaRPr lang="de-DE"/>
           </a:p>
@@ -9184,7 +9423,7 @@
           <a:p>
             <a:fld id="{0FC658A1-4302-42C8-B31D-D1430F6AE143}" type="datetime1">
               <a:rPr lang="de-DE" smtClean="0"/>
-              <a:t>19.02.2013</a:t>
+              <a:t>20.02.2013</a:t>
             </a:fld>
             <a:endParaRPr lang="de-DE"/>
           </a:p>
@@ -9511,7 +9750,7 @@
           <a:p>
             <a:fld id="{0FC658A1-4302-42C8-B31D-D1430F6AE143}" type="datetime1">
               <a:rPr lang="de-DE" smtClean="0"/>
-              <a:t>19.02.2013</a:t>
+              <a:t>20.02.2013</a:t>
             </a:fld>
             <a:endParaRPr lang="de-DE"/>
           </a:p>
@@ -9859,7 +10098,7 @@
           <a:p>
             <a:fld id="{0FC658A1-4302-42C8-B31D-D1430F6AE143}" type="datetime1">
               <a:rPr lang="de-DE" smtClean="0"/>
-              <a:t>19.02.2013</a:t>
+              <a:t>20.02.2013</a:t>
             </a:fld>
             <a:endParaRPr lang="de-DE"/>
           </a:p>
@@ -10507,7 +10746,7 @@
           <a:p>
             <a:fld id="{0FC658A1-4302-42C8-B31D-D1430F6AE143}" type="datetime1">
               <a:rPr lang="de-DE" smtClean="0"/>
-              <a:t>19.02.2013</a:t>
+              <a:t>20.02.2013</a:t>
             </a:fld>
             <a:endParaRPr lang="de-DE"/>
           </a:p>
@@ -10746,49 +10985,21 @@
           <a:lstStyle/>
           <a:p>
             <a:r>
-              <a:rPr lang="de-DE" i="1" dirty="0"/>
-              <a:t>NI </a:t>
-            </a:r>
-            <a:r>
-              <a:rPr lang="de-DE" i="1" dirty="0" err="1"/>
-              <a:t>Actor</a:t>
-            </a:r>
-            <a:r>
-              <a:rPr lang="de-DE" i="1" dirty="0"/>
-              <a:t> </a:t>
-            </a:r>
-            <a:r>
-              <a:rPr lang="de-DE" i="1" dirty="0" smtClean="0"/>
-              <a:t>Framework</a:t>
-            </a:r>
-            <a:r>
-              <a:rPr lang="de-DE" dirty="0" smtClean="0"/>
+              <a:rPr lang="en-US" i="1" dirty="0" smtClean="0"/>
+              <a:t>NI Actor Framework</a:t>
+            </a:r>
+            <a:r>
+              <a:rPr lang="en-US" dirty="0" smtClean="0"/>
               <a:t/>
             </a:r>
             <a:br>
-              <a:rPr lang="de-DE" dirty="0" smtClean="0"/>
+              <a:rPr lang="en-US" dirty="0" smtClean="0"/>
             </a:br>
             <a:r>
-              <a:rPr lang="de-DE" dirty="0" smtClean="0"/>
-              <a:t>Communication </a:t>
-            </a:r>
-            <a:r>
-              <a:rPr lang="de-DE" dirty="0" err="1" smtClean="0"/>
-              <a:t>Scheme</a:t>
-            </a:r>
-            <a:r>
-              <a:rPr lang="de-DE" dirty="0" smtClean="0"/>
-              <a:t> – </a:t>
-            </a:r>
-            <a:r>
-              <a:rPr lang="de-DE" dirty="0" err="1" smtClean="0"/>
-              <a:t>Local</a:t>
-            </a:r>
-            <a:r>
-              <a:rPr lang="de-DE" dirty="0" smtClean="0"/>
-              <a:t> Queues</a:t>
-            </a:r>
-            <a:endParaRPr lang="de-DE" dirty="0"/>
+              <a:rPr lang="en-US" dirty="0" smtClean="0"/>
+              <a:t>Communication Scheme – Local Queues</a:t>
+            </a:r>
+            <a:endParaRPr lang="en-US" dirty="0"/>
           </a:p>
         </p:txBody>
       </p:sp>
@@ -10815,18 +11026,9 @@
           <a:lstStyle/>
           <a:p>
             <a:r>
-              <a:rPr lang="de-DE" sz="1600" b="1" dirty="0" err="1"/>
-              <a:t>Launching</a:t>
-            </a:r>
-            <a:r>
-              <a:rPr lang="de-DE" sz="1600" b="1" dirty="0"/>
-              <a:t> </a:t>
-            </a:r>
-            <a:r>
-              <a:rPr lang="de-DE" sz="1600" b="1" dirty="0" err="1"/>
-              <a:t>Actors</a:t>
-            </a:r>
-            <a:endParaRPr lang="de-DE" sz="1600" b="1" dirty="0"/>
+              <a:rPr lang="en-US" sz="1600" b="1" dirty="0" smtClean="0"/>
+              <a:t>Launching Actors</a:t>
+            </a:r>
           </a:p>
           <a:p>
             <a:pPr marL="285750" indent="-285750">
@@ -10834,50 +11036,14 @@
               <a:buChar char="•"/>
             </a:pPr>
             <a:r>
-              <a:rPr lang="de-DE" sz="1800" dirty="0" err="1"/>
-              <a:t>Actors</a:t>
-            </a:r>
-            <a:r>
-              <a:rPr lang="de-DE" sz="1800" dirty="0"/>
-              <a:t> </a:t>
-            </a:r>
-            <a:r>
-              <a:rPr lang="de-DE" sz="1800" dirty="0" err="1"/>
-              <a:t>are</a:t>
-            </a:r>
-            <a:r>
-              <a:rPr lang="de-DE" sz="1800" dirty="0"/>
-              <a:t> </a:t>
-            </a:r>
-            <a:r>
-              <a:rPr lang="de-DE" sz="1800" dirty="0" err="1"/>
-              <a:t>derived</a:t>
-            </a:r>
-            <a:r>
-              <a:rPr lang="de-DE" sz="1800" dirty="0"/>
-              <a:t> </a:t>
-            </a:r>
-            <a:r>
-              <a:rPr lang="de-DE" sz="1800" dirty="0" err="1"/>
-              <a:t>classes</a:t>
-            </a:r>
-            <a:r>
-              <a:rPr lang="de-DE" sz="1800" dirty="0"/>
-              <a:t> </a:t>
-            </a:r>
-            <a:r>
-              <a:rPr lang="de-DE" sz="1800" dirty="0" err="1"/>
-              <a:t>of</a:t>
-            </a:r>
-            <a:r>
-              <a:rPr lang="de-DE" sz="1800" dirty="0"/>
-              <a:t> </a:t>
-            </a:r>
-            <a:r>
-              <a:rPr lang="de-DE" sz="1800" i="1" dirty="0" err="1"/>
+              <a:rPr lang="en-US" sz="1800" dirty="0" smtClean="0"/>
+              <a:t>Actors are derived classes of </a:t>
+            </a:r>
+            <a:r>
+              <a:rPr lang="en-US" sz="1800" i="1" dirty="0" err="1" smtClean="0"/>
               <a:t>Actor.lvclass</a:t>
             </a:r>
-            <a:endParaRPr lang="de-DE" sz="1800" i="1" dirty="0"/>
+            <a:endParaRPr lang="en-US" sz="1800" i="1" dirty="0" smtClean="0"/>
           </a:p>
           <a:p>
             <a:pPr marL="285750" indent="-285750">
@@ -10885,87 +11051,23 @@
               <a:buChar char="•"/>
             </a:pPr>
             <a:r>
-              <a:rPr lang="de-DE" sz="1800" dirty="0" err="1"/>
-              <a:t>Caller-Enqueuer</a:t>
-            </a:r>
-            <a:r>
-              <a:rPr lang="de-DE" sz="1800" dirty="0"/>
+              <a:rPr lang="en-US" sz="1800" dirty="0" smtClean="0"/>
+              <a:t>Caller-</a:t>
+            </a:r>
+            <a:r>
+              <a:rPr lang="en-US" sz="1800" dirty="0" err="1" smtClean="0"/>
+              <a:t>Enqueuer</a:t>
+            </a:r>
+            <a:r>
+              <a:rPr lang="en-US" sz="1800" dirty="0" smtClean="0"/>
               <a:t/>
             </a:r>
             <a:br>
-              <a:rPr lang="de-DE" sz="1800" dirty="0"/>
+              <a:rPr lang="en-US" sz="1800" dirty="0" smtClean="0"/>
             </a:br>
             <a:r>
-              <a:rPr lang="de-DE" sz="1800" dirty="0" err="1"/>
-              <a:t>is</a:t>
-            </a:r>
-            <a:r>
-              <a:rPr lang="de-DE" sz="1800" dirty="0"/>
-              <a:t> </a:t>
-            </a:r>
-            <a:r>
-              <a:rPr lang="de-DE" sz="1800" dirty="0" err="1"/>
-              <a:t>used</a:t>
-            </a:r>
-            <a:r>
-              <a:rPr lang="de-DE" sz="1800" dirty="0"/>
-              <a:t> </a:t>
-            </a:r>
-            <a:r>
-              <a:rPr lang="de-DE" sz="1800" dirty="0" err="1"/>
-              <a:t>by</a:t>
-            </a:r>
-            <a:r>
-              <a:rPr lang="de-DE" sz="1800" dirty="0"/>
-              <a:t> </a:t>
-            </a:r>
-            <a:r>
-              <a:rPr lang="de-DE" sz="1800" dirty="0" err="1"/>
-              <a:t>Actor</a:t>
-            </a:r>
-            <a:r>
-              <a:rPr lang="de-DE" sz="1800" dirty="0"/>
-              <a:t> </a:t>
-            </a:r>
-            <a:r>
-              <a:rPr lang="de-DE" sz="1800" dirty="0" err="1"/>
-              <a:t>to</a:t>
-            </a:r>
-            <a:r>
-              <a:rPr lang="de-DE" sz="1800" dirty="0"/>
-              <a:t> send </a:t>
-            </a:r>
-            <a:r>
-              <a:rPr lang="de-DE" sz="1800" dirty="0" err="1"/>
-              <a:t>messages</a:t>
-            </a:r>
-            <a:r>
-              <a:rPr lang="de-DE" sz="1800" dirty="0"/>
-              <a:t> </a:t>
-            </a:r>
-            <a:r>
-              <a:rPr lang="de-DE" sz="1800" dirty="0" err="1"/>
-              <a:t>to</a:t>
-            </a:r>
-            <a:r>
-              <a:rPr lang="de-DE" sz="1800" dirty="0"/>
-              <a:t> </a:t>
-            </a:r>
-            <a:r>
-              <a:rPr lang="de-DE" sz="1800" dirty="0" err="1"/>
-              <a:t>the</a:t>
-            </a:r>
-            <a:r>
-              <a:rPr lang="de-DE" sz="1800" dirty="0"/>
-              <a:t> </a:t>
-            </a:r>
-            <a:r>
-              <a:rPr lang="de-DE" sz="1800" dirty="0" err="1"/>
-              <a:t>Caller</a:t>
-            </a:r>
-            <a:r>
-              <a:rPr lang="de-DE" sz="1800" dirty="0"/>
-              <a:t>.</a:t>
+              <a:rPr lang="en-US" sz="1800" dirty="0" smtClean="0"/>
+              <a:t>is used by Actor to send messages to the Caller.</a:t>
             </a:r>
           </a:p>
           <a:p>
@@ -10974,89 +11076,25 @@
               <a:buChar char="•"/>
             </a:pPr>
             <a:r>
-              <a:rPr lang="de-DE" sz="1800" dirty="0" err="1"/>
-              <a:t>Actor-Enqueuer</a:t>
-            </a:r>
-            <a:r>
-              <a:rPr lang="de-DE" sz="1800" dirty="0"/>
+              <a:rPr lang="en-US" sz="1800" dirty="0" smtClean="0"/>
+              <a:t>Actor-</a:t>
+            </a:r>
+            <a:r>
+              <a:rPr lang="en-US" sz="1800" dirty="0" err="1" smtClean="0"/>
+              <a:t>Enqueuer</a:t>
+            </a:r>
+            <a:r>
+              <a:rPr lang="en-US" sz="1800" dirty="0" smtClean="0"/>
               <a:t/>
             </a:r>
             <a:br>
-              <a:rPr lang="de-DE" sz="1800" dirty="0"/>
+              <a:rPr lang="en-US" sz="1800" dirty="0" smtClean="0"/>
             </a:br>
             <a:r>
-              <a:rPr lang="de-DE" sz="1800" dirty="0" err="1"/>
-              <a:t>is</a:t>
-            </a:r>
-            <a:r>
-              <a:rPr lang="de-DE" sz="1800" dirty="0"/>
-              <a:t> </a:t>
-            </a:r>
-            <a:r>
-              <a:rPr lang="de-DE" sz="1800" dirty="0" err="1"/>
-              <a:t>used</a:t>
-            </a:r>
-            <a:r>
-              <a:rPr lang="de-DE" sz="1800" dirty="0"/>
-              <a:t> </a:t>
-            </a:r>
-            <a:r>
-              <a:rPr lang="de-DE" sz="1800" dirty="0" err="1"/>
-              <a:t>by</a:t>
-            </a:r>
-            <a:r>
-              <a:rPr lang="de-DE" sz="1800" dirty="0"/>
-              <a:t> </a:t>
-            </a:r>
-            <a:r>
-              <a:rPr lang="de-DE" sz="1800" dirty="0" err="1"/>
-              <a:t>Caller</a:t>
-            </a:r>
-            <a:r>
-              <a:rPr lang="de-DE" sz="1800" dirty="0"/>
-              <a:t> </a:t>
-            </a:r>
-            <a:r>
-              <a:rPr lang="de-DE" sz="1800" dirty="0" err="1"/>
-              <a:t>to</a:t>
-            </a:r>
-            <a:r>
-              <a:rPr lang="de-DE" sz="1800" dirty="0"/>
-              <a:t> send </a:t>
-            </a:r>
-            <a:r>
-              <a:rPr lang="de-DE" sz="1800" dirty="0" err="1"/>
-              <a:t>messages</a:t>
-            </a:r>
-            <a:r>
-              <a:rPr lang="de-DE" sz="1800" dirty="0"/>
-              <a:t> </a:t>
-            </a:r>
-            <a:r>
-              <a:rPr lang="de-DE" sz="1800" dirty="0" err="1"/>
-              <a:t>to</a:t>
-            </a:r>
-            <a:r>
-              <a:rPr lang="de-DE" sz="1800" dirty="0"/>
-              <a:t> </a:t>
-            </a:r>
-            <a:r>
-              <a:rPr lang="de-DE" sz="1800" dirty="0" err="1"/>
-              <a:t>the</a:t>
-            </a:r>
-            <a:r>
-              <a:rPr lang="de-DE" sz="1800" dirty="0"/>
-              <a:t> </a:t>
-            </a:r>
-            <a:r>
-              <a:rPr lang="de-DE" sz="1800" dirty="0" err="1"/>
-              <a:t>Actor</a:t>
-            </a:r>
-            <a:r>
-              <a:rPr lang="de-DE" sz="1800" dirty="0"/>
-              <a:t>.</a:t>
-            </a:r>
-            <a:endParaRPr lang="de-DE" sz="2000" dirty="0"/>
+              <a:rPr lang="en-US" sz="1800" dirty="0" smtClean="0"/>
+              <a:t>is used by Caller to send messages to the Actor.</a:t>
+            </a:r>
+            <a:endParaRPr lang="en-US" sz="2000" dirty="0"/>
           </a:p>
         </p:txBody>
       </p:sp>
@@ -11083,19 +11121,15 @@
           <a:lstStyle/>
           <a:p>
             <a:r>
-              <a:rPr lang="de-DE" sz="1600" b="1" dirty="0" err="1"/>
-              <a:t>Asynchronous</a:t>
-            </a:r>
-            <a:r>
-              <a:rPr lang="de-DE" sz="1600" b="1" dirty="0"/>
-              <a:t> Communication </a:t>
-            </a:r>
-            <a:r>
-              <a:rPr lang="de-DE" sz="1600" dirty="0"/>
+              <a:rPr lang="en-US" sz="1600" b="1" dirty="0" smtClean="0"/>
+              <a:t>Asynchronous Communication </a:t>
+            </a:r>
+            <a:r>
+              <a:rPr lang="en-US" sz="1600" dirty="0" smtClean="0"/>
               <a:t>via </a:t>
             </a:r>
             <a:r>
-              <a:rPr lang="de-DE" sz="1600" b="1" dirty="0"/>
+              <a:rPr lang="en-US" sz="1600" b="1" dirty="0" smtClean="0"/>
               <a:t>Queue</a:t>
             </a:r>
           </a:p>
@@ -11105,46 +11139,14 @@
               <a:buChar char="•"/>
             </a:pPr>
             <a:r>
-              <a:rPr lang="de-DE" sz="1800" dirty="0"/>
-              <a:t>Messages </a:t>
-            </a:r>
-            <a:r>
-              <a:rPr lang="de-DE" sz="1800" dirty="0" err="1"/>
-              <a:t>are</a:t>
-            </a:r>
-            <a:r>
-              <a:rPr lang="de-DE" sz="1800" dirty="0"/>
-              <a:t> </a:t>
-            </a:r>
-            <a:r>
-              <a:rPr lang="de-DE" sz="1800" dirty="0" err="1"/>
-              <a:t>derived</a:t>
-            </a:r>
-            <a:r>
-              <a:rPr lang="de-DE" sz="1800" dirty="0"/>
-              <a:t> </a:t>
-            </a:r>
-            <a:r>
-              <a:rPr lang="de-DE" sz="1800" dirty="0" err="1"/>
-              <a:t>classes</a:t>
-            </a:r>
-            <a:r>
-              <a:rPr lang="de-DE" sz="1800" dirty="0"/>
-              <a:t> </a:t>
-            </a:r>
-            <a:r>
-              <a:rPr lang="de-DE" sz="1800" dirty="0" err="1"/>
-              <a:t>of</a:t>
-            </a:r>
-            <a:r>
-              <a:rPr lang="de-DE" sz="1800" dirty="0"/>
-              <a:t> </a:t>
-            </a:r>
-            <a:r>
-              <a:rPr lang="de-DE" sz="1800" i="1" dirty="0" err="1"/>
+              <a:rPr lang="en-US" sz="1800" dirty="0" smtClean="0"/>
+              <a:t>Messages are derived classes of </a:t>
+            </a:r>
+            <a:r>
+              <a:rPr lang="en-US" sz="1800" i="1" dirty="0" err="1" smtClean="0"/>
               <a:t>Message.lvclass</a:t>
             </a:r>
-            <a:endParaRPr lang="de-DE" sz="1800" i="1" dirty="0"/>
+            <a:endParaRPr lang="en-US" sz="1800" i="1" dirty="0" smtClean="0"/>
           </a:p>
           <a:p>
             <a:pPr marL="285750" indent="-285750">
@@ -11152,133 +11154,29 @@
               <a:buChar char="•"/>
             </a:pPr>
             <a:r>
-              <a:rPr lang="de-DE" sz="1800" dirty="0"/>
-              <a:t>Messages </a:t>
-            </a:r>
-            <a:r>
-              <a:rPr lang="de-DE" sz="1800" dirty="0" err="1"/>
-              <a:t>are</a:t>
-            </a:r>
-            <a:r>
-              <a:rPr lang="de-DE" sz="1800" dirty="0"/>
-              <a:t> </a:t>
-            </a:r>
-            <a:r>
-              <a:rPr lang="de-DE" sz="1800" dirty="0" err="1"/>
-              <a:t>calling</a:t>
-            </a:r>
-            <a:r>
-              <a:rPr lang="de-DE" sz="1800" dirty="0"/>
-              <a:t> </a:t>
-            </a:r>
-            <a:r>
-              <a:rPr lang="de-DE" sz="1800" dirty="0" err="1"/>
-              <a:t>public</a:t>
-            </a:r>
-            <a:r>
-              <a:rPr lang="de-DE" sz="1800" dirty="0"/>
-              <a:t> VIs </a:t>
-            </a:r>
-            <a:r>
-              <a:rPr lang="de-DE" sz="1800" dirty="0" err="1"/>
-              <a:t>of</a:t>
-            </a:r>
-            <a:r>
-              <a:rPr lang="de-DE" sz="1800" dirty="0"/>
-              <a:t> an </a:t>
-            </a:r>
-            <a:r>
-              <a:rPr lang="de-DE" sz="1800" dirty="0" err="1"/>
-              <a:t>Actor</a:t>
-            </a:r>
-            <a:r>
-              <a:rPr lang="de-DE" sz="1800" dirty="0"/>
+              <a:rPr lang="en-US" sz="1800" dirty="0" smtClean="0"/>
+              <a:t>Messages are calling public VIs of an Actor.</a:t>
+            </a:r>
+          </a:p>
+          <a:p>
+            <a:pPr marL="285750" indent="-285750">
+              <a:buFont typeface="Arial" pitchFamily="34" charset="0"/>
+              <a:buChar char="•"/>
+            </a:pPr>
+            <a:r>
+              <a:rPr lang="en-US" sz="1800" dirty="0" smtClean="0"/>
+              <a:t>Actor-Messages can be generated automatically be using </a:t>
+            </a:r>
+            <a:r>
+              <a:rPr lang="en-US" sz="1800" i="1" dirty="0" smtClean="0"/>
+              <a:t>Tools&gt;Actor Framework Message Maker</a:t>
+            </a:r>
+            <a:r>
+              <a:rPr lang="en-US" sz="1800" dirty="0" smtClean="0"/>
               <a:t>.</a:t>
             </a:r>
           </a:p>
           <a:p>
-            <a:pPr marL="285750" indent="-285750">
-              <a:buFont typeface="Arial" pitchFamily="34" charset="0"/>
-              <a:buChar char="•"/>
-            </a:pPr>
-            <a:r>
-              <a:rPr lang="de-DE" sz="1800" dirty="0" err="1"/>
-              <a:t>Actor</a:t>
-            </a:r>
-            <a:r>
-              <a:rPr lang="de-DE" sz="1800" dirty="0"/>
-              <a:t>-Messages </a:t>
-            </a:r>
-            <a:r>
-              <a:rPr lang="de-DE" sz="1800" dirty="0" err="1"/>
-              <a:t>can</a:t>
-            </a:r>
-            <a:r>
-              <a:rPr lang="de-DE" sz="1800" dirty="0"/>
-              <a:t> </a:t>
-            </a:r>
-            <a:r>
-              <a:rPr lang="de-DE" sz="1800" dirty="0" err="1"/>
-              <a:t>be</a:t>
-            </a:r>
-            <a:r>
-              <a:rPr lang="de-DE" sz="1800" dirty="0"/>
-              <a:t> </a:t>
-            </a:r>
-            <a:r>
-              <a:rPr lang="de-DE" sz="1800" dirty="0" err="1"/>
-              <a:t>generated</a:t>
-            </a:r>
-            <a:r>
-              <a:rPr lang="de-DE" sz="1800" dirty="0"/>
-              <a:t> </a:t>
-            </a:r>
-            <a:r>
-              <a:rPr lang="de-DE" sz="1800" dirty="0" err="1"/>
-              <a:t>automatically</a:t>
-            </a:r>
-            <a:r>
-              <a:rPr lang="de-DE" sz="1800" dirty="0"/>
-              <a:t> </a:t>
-            </a:r>
-            <a:r>
-              <a:rPr lang="de-DE" sz="1800" dirty="0" err="1"/>
-              <a:t>be</a:t>
-            </a:r>
-            <a:r>
-              <a:rPr lang="de-DE" sz="1800" dirty="0"/>
-              <a:t> </a:t>
-            </a:r>
-            <a:r>
-              <a:rPr lang="de-DE" sz="1800" dirty="0" err="1"/>
-              <a:t>using</a:t>
-            </a:r>
-            <a:r>
-              <a:rPr lang="de-DE" sz="1800" dirty="0"/>
-              <a:t> </a:t>
-            </a:r>
-            <a:r>
-              <a:rPr lang="de-DE" sz="1800" i="1" dirty="0"/>
-              <a:t>Tools&gt;</a:t>
-            </a:r>
-            <a:r>
-              <a:rPr lang="de-DE" sz="1800" i="1" dirty="0" err="1"/>
-              <a:t>Actor</a:t>
-            </a:r>
-            <a:r>
-              <a:rPr lang="de-DE" sz="1800" i="1" dirty="0"/>
-              <a:t> Framework Message </a:t>
-            </a:r>
-            <a:r>
-              <a:rPr lang="de-DE" sz="1800" i="1" dirty="0" err="1"/>
-              <a:t>Maker</a:t>
-            </a:r>
-            <a:r>
-              <a:rPr lang="de-DE" sz="1800" dirty="0"/>
-              <a:t>.</a:t>
-            </a:r>
-          </a:p>
-          <a:p>
             <a:endParaRPr lang="de-DE" sz="2000" dirty="0"/>
           </a:p>
         </p:txBody>
@@ -11300,7 +11198,7 @@
           <a:p>
             <a:fld id="{0FC658A1-4302-42C8-B31D-D1430F6AE143}" type="datetime1">
               <a:rPr lang="de-DE" smtClean="0"/>
-              <a:t>19.02.2013</a:t>
+              <a:t>20.02.2013</a:t>
             </a:fld>
             <a:endParaRPr lang="de-DE"/>
           </a:p>
@@ -11510,37 +11408,17 @@
               <a:buChar char="•"/>
             </a:pPr>
             <a:r>
-              <a:rPr lang="de-DE" dirty="0" err="1" smtClean="0"/>
-              <a:t>Originally</a:t>
-            </a:r>
-            <a:r>
-              <a:rPr lang="de-DE" dirty="0" smtClean="0"/>
-              <a:t> </a:t>
-            </a:r>
-            <a:r>
-              <a:rPr lang="de-DE" dirty="0" err="1" smtClean="0"/>
-              <a:t>developed</a:t>
-            </a:r>
-            <a:r>
-              <a:rPr lang="de-DE" dirty="0" smtClean="0"/>
-              <a:t> </a:t>
-            </a:r>
-            <a:r>
-              <a:rPr lang="de-DE" dirty="0" err="1" smtClean="0"/>
-              <a:t>at</a:t>
-            </a:r>
-            <a:r>
-              <a:rPr lang="de-DE" dirty="0" smtClean="0"/>
-              <a:t> CERN (</a:t>
-            </a:r>
-            <a:r>
-              <a:rPr lang="de-DE" dirty="0" smtClean="0">
+              <a:rPr lang="en-US" dirty="0" smtClean="0"/>
+              <a:t>Originally developed at CERN (</a:t>
+            </a:r>
+            <a:r>
+              <a:rPr lang="en-US" dirty="0" smtClean="0">
                 <a:hlinkClick r:id="rId2"/>
               </a:rPr>
               <a:t>www.cern.ch/dim</a:t>
             </a:r>
             <a:r>
-              <a:rPr lang="de-DE" dirty="0" smtClean="0"/>
+              <a:rPr lang="en-US" dirty="0" smtClean="0"/>
               <a:t>)</a:t>
             </a:r>
           </a:p>
@@ -11550,14 +11428,9 @@
               <a:buChar char="•"/>
             </a:pPr>
             <a:r>
-              <a:rPr lang="de-DE" dirty="0" smtClean="0"/>
-              <a:t>DIM </a:t>
-            </a:r>
-            <a:r>
-              <a:rPr lang="de-DE" dirty="0" err="1" smtClean="0"/>
-              <a:t>provides</a:t>
-            </a:r>
-            <a:endParaRPr lang="de-DE" dirty="0" smtClean="0"/>
+              <a:rPr lang="en-US" dirty="0" smtClean="0"/>
+              <a:t>DIM provides</a:t>
+            </a:r>
           </a:p>
           <a:p>
             <a:pPr marL="914400" lvl="1" indent="-457200">
@@ -11565,7 +11438,7 @@
               <a:buChar char="•"/>
             </a:pPr>
             <a:r>
-              <a:rPr lang="de-DE" dirty="0" smtClean="0"/>
+              <a:rPr lang="en-US" dirty="0" smtClean="0"/>
               <a:t>Publisher-Subscriber Pattern</a:t>
             </a:r>
           </a:p>
@@ -11575,7 +11448,7 @@
               <a:buChar char="•"/>
             </a:pPr>
             <a:r>
-              <a:rPr lang="de-DE" dirty="0" smtClean="0"/>
+              <a:rPr lang="en-US" dirty="0" smtClean="0"/>
               <a:t>Command Pattern</a:t>
             </a:r>
           </a:p>
@@ -11585,32 +11458,16 @@
               <a:buChar char="•"/>
             </a:pPr>
             <a:r>
-              <a:rPr lang="de-DE" dirty="0" smtClean="0"/>
-              <a:t>DIM </a:t>
-            </a:r>
-            <a:r>
-              <a:rPr lang="de-DE" dirty="0" err="1" smtClean="0"/>
-              <a:t>connects</a:t>
-            </a:r>
-            <a:r>
-              <a:rPr lang="de-DE" dirty="0" smtClean="0"/>
-              <a:t> </a:t>
-            </a:r>
-            <a:r>
-              <a:rPr lang="de-DE" dirty="0" err="1" smtClean="0"/>
+              <a:rPr lang="en-US" dirty="0" smtClean="0"/>
+              <a:t>DIM connects </a:t>
+            </a:r>
+            <a:r>
+              <a:rPr lang="en-US" dirty="0" err="1" smtClean="0"/>
               <a:t>heterogenous</a:t>
             </a:r>
             <a:r>
-              <a:rPr lang="de-DE" dirty="0" smtClean="0"/>
-              <a:t> </a:t>
-            </a:r>
-            <a:r>
-              <a:rPr lang="de-DE" dirty="0" err="1" smtClean="0"/>
-              <a:t>systems</a:t>
-            </a:r>
-            <a:r>
-              <a:rPr lang="de-DE" dirty="0" smtClean="0"/>
-              <a:t>.</a:t>
+              <a:rPr lang="en-US" dirty="0" smtClean="0"/>
+              <a:t> systems.</a:t>
             </a:r>
           </a:p>
           <a:p>
@@ -11619,26 +11476,9 @@
               <a:buChar char="•"/>
             </a:pPr>
             <a:r>
-              <a:rPr lang="de-DE" dirty="0" err="1" smtClean="0"/>
-              <a:t>Various</a:t>
-            </a:r>
-            <a:r>
-              <a:rPr lang="de-DE" dirty="0" smtClean="0"/>
-              <a:t> </a:t>
-            </a:r>
-            <a:r>
-              <a:rPr lang="de-DE" dirty="0" err="1" smtClean="0"/>
-              <a:t>operating</a:t>
-            </a:r>
-            <a:r>
-              <a:rPr lang="de-DE" dirty="0" smtClean="0"/>
-              <a:t> </a:t>
-            </a:r>
-            <a:r>
-              <a:rPr lang="de-DE" dirty="0" err="1" smtClean="0"/>
-              <a:t>systems</a:t>
-            </a:r>
-            <a:endParaRPr lang="de-DE" dirty="0" smtClean="0"/>
+              <a:rPr lang="en-US" dirty="0" smtClean="0"/>
+              <a:t>Various operating systems</a:t>
+            </a:r>
           </a:p>
           <a:p>
             <a:pPr marL="914400" lvl="1" indent="-457200">
@@ -11646,26 +11486,9 @@
               <a:buChar char="•"/>
             </a:pPr>
             <a:r>
-              <a:rPr lang="de-DE" dirty="0" err="1" smtClean="0"/>
-              <a:t>Various</a:t>
-            </a:r>
-            <a:r>
-              <a:rPr lang="de-DE" dirty="0" smtClean="0"/>
-              <a:t> </a:t>
-            </a:r>
-            <a:r>
-              <a:rPr lang="de-DE" dirty="0" err="1" smtClean="0"/>
-              <a:t>programming</a:t>
-            </a:r>
-            <a:r>
-              <a:rPr lang="de-DE" dirty="0" smtClean="0"/>
-              <a:t> </a:t>
-            </a:r>
-            <a:r>
-              <a:rPr lang="de-DE" dirty="0" err="1" smtClean="0"/>
-              <a:t>languages</a:t>
-            </a:r>
-            <a:endParaRPr lang="de-DE" dirty="0" smtClean="0"/>
+              <a:rPr lang="en-US" dirty="0" smtClean="0"/>
+              <a:t>Various programming languages</a:t>
+            </a:r>
           </a:p>
           <a:p>
             <a:pPr marL="457200" indent="-457200">
@@ -11673,26 +11496,9 @@
               <a:buChar char="•"/>
             </a:pPr>
             <a:r>
-              <a:rPr lang="de-DE" dirty="0" smtClean="0"/>
-              <a:t>LabVIEW-DIM-Interface</a:t>
-            </a:r>
-            <a:r>
-              <a:rPr lang="de-DE" dirty="0"/>
-              <a:t> </a:t>
-            </a:r>
-            <a:r>
-              <a:rPr lang="de-DE" dirty="0" err="1" smtClean="0"/>
-              <a:t>is</a:t>
-            </a:r>
-            <a:r>
-              <a:rPr lang="de-DE" dirty="0" smtClean="0"/>
-              <a:t> </a:t>
-            </a:r>
-            <a:r>
-              <a:rPr lang="de-DE" dirty="0" err="1" smtClean="0"/>
-              <a:t>existing</a:t>
-            </a:r>
-            <a:endParaRPr lang="de-DE" dirty="0" smtClean="0"/>
+              <a:rPr lang="en-US" dirty="0" smtClean="0"/>
+              <a:t>LabVIEW-DIM-Interface is existing</a:t>
+            </a:r>
           </a:p>
           <a:p>
             <a:pPr marL="914400" lvl="1" indent="-457200">
@@ -11700,33 +11506,21 @@
               <a:buChar char="•"/>
             </a:pPr>
             <a:r>
-              <a:rPr lang="de-DE" dirty="0" smtClean="0">
+              <a:rPr lang="en-US" dirty="0" smtClean="0">
                 <a:hlinkClick r:id="rId3"/>
               </a:rPr>
-              <a:t>http</a:t>
-            </a:r>
-            <a:r>
-              <a:rPr lang="de-DE" dirty="0">
-                <a:hlinkClick r:id="rId3"/>
-              </a:rPr>
-              <a:t>://</a:t>
-            </a:r>
-            <a:r>
-              <a:rPr lang="de-DE" dirty="0" smtClean="0">
-                <a:hlinkClick r:id="rId3"/>
-              </a:rPr>
-              <a:t>wiki.gsi.de/cgi-bin/view/CSframework/LVDimInterface</a:t>
-            </a:r>
+              <a:t>http://wiki.gsi.de/cgi-bin/view/CSframework/LVDimInterface</a:t>
+            </a:r>
+            <a:endParaRPr lang="en-US" dirty="0" smtClean="0"/>
+          </a:p>
+          <a:p>
+            <a:pPr marL="914400" lvl="1" indent="-457200">
+              <a:buFont typeface="Arial" pitchFamily="34" charset="0"/>
+              <a:buChar char="•"/>
+            </a:pPr>
             <a:endParaRPr lang="de-DE" dirty="0" smtClean="0"/>
           </a:p>
           <a:p>
-            <a:pPr marL="914400" lvl="1" indent="-457200">
-              <a:buFont typeface="Arial" pitchFamily="34" charset="0"/>
-              <a:buChar char="•"/>
-            </a:pPr>
-            <a:endParaRPr lang="de-DE" dirty="0" smtClean="0"/>
-          </a:p>
-          <a:p>
             <a:pPr marL="457200" indent="-457200">
               <a:buFont typeface="Arial" pitchFamily="34" charset="0"/>
               <a:buChar char="•"/>
@@ -11752,7 +11546,7 @@
           <a:p>
             <a:fld id="{66514710-0C99-4DBD-B4EA-4EE375B296BE}" type="datetime1">
               <a:rPr lang="de-DE" smtClean="0"/>
-              <a:t>19.02.2013</a:t>
+              <a:t>20.02.2013</a:t>
             </a:fld>
             <a:endParaRPr lang="de-DE"/>
           </a:p>

</xml_diff>

<commit_message>
Add CC and link to Linked Network Actor.
</commit_message>
<xml_diff>
--- a/Documentation/NI Actor Framework -DIMActor.pptx
+++ b/Documentation/NI Actor Framework -DIMActor.pptx
@@ -210,7 +210,7 @@
           <a:p>
             <a:fld id="{BAB46D27-B0DF-4E98-85C6-8BD5834E4FC4}" type="datetimeFigureOut">
               <a:rPr lang="de-DE" smtClean="0"/>
-              <a:t>20.02.2013</a:t>
+              <a:t>21.02.2013</a:t>
             </a:fld>
             <a:endParaRPr lang="de-DE"/>
           </a:p>
@@ -705,7 +705,7 @@
             <a:fld id="{B418CCE3-ADF8-4D6E-B263-90E85820EC44}" type="datetime1">
               <a:rPr lang="de-DE" smtClean="0"/>
               <a:pPr/>
-              <a:t>20.02.2013</a:t>
+              <a:t>21.02.2013</a:t>
             </a:fld>
             <a:endParaRPr lang="de-DE" dirty="0"/>
           </a:p>
@@ -901,7 +901,7 @@
           <a:p>
             <a:fld id="{BB834E4F-0125-4AD2-8584-167B6DA5606F}" type="datetime1">
               <a:rPr lang="de-DE" smtClean="0"/>
-              <a:t>20.02.2013</a:t>
+              <a:t>21.02.2013</a:t>
             </a:fld>
             <a:endParaRPr lang="de-DE"/>
           </a:p>
@@ -1081,7 +1081,7 @@
           <a:p>
             <a:fld id="{91968600-0E23-484E-9747-10E22BA18989}" type="datetime1">
               <a:rPr lang="de-DE" smtClean="0"/>
-              <a:t>20.02.2013</a:t>
+              <a:t>21.02.2013</a:t>
             </a:fld>
             <a:endParaRPr lang="de-DE"/>
           </a:p>
@@ -1272,7 +1272,7 @@
           <a:p>
             <a:fld id="{0FC658A1-4302-42C8-B31D-D1430F6AE143}" type="datetime1">
               <a:rPr lang="de-DE" smtClean="0"/>
-              <a:t>20.02.2013</a:t>
+              <a:t>21.02.2013</a:t>
             </a:fld>
             <a:endParaRPr lang="de-DE"/>
           </a:p>
@@ -1525,7 +1525,7 @@
           <a:p>
             <a:fld id="{1B6924CB-05FB-4179-B2D0-92DB10EA4650}" type="datetime1">
               <a:rPr lang="de-DE" smtClean="0"/>
-              <a:t>20.02.2013</a:t>
+              <a:t>21.02.2013</a:t>
             </a:fld>
             <a:endParaRPr lang="de-DE"/>
           </a:p>
@@ -1813,7 +1813,7 @@
           <a:p>
             <a:fld id="{66514710-0C99-4DBD-B4EA-4EE375B296BE}" type="datetime1">
               <a:rPr lang="de-DE" smtClean="0"/>
-              <a:t>20.02.2013</a:t>
+              <a:t>21.02.2013</a:t>
             </a:fld>
             <a:endParaRPr lang="de-DE"/>
           </a:p>
@@ -2235,7 +2235,7 @@
           <a:p>
             <a:fld id="{D5C6EF29-F2FB-47AB-A486-8D1D28D3E553}" type="datetime1">
               <a:rPr lang="de-DE" smtClean="0"/>
-              <a:t>20.02.2013</a:t>
+              <a:t>21.02.2013</a:t>
             </a:fld>
             <a:endParaRPr lang="de-DE"/>
           </a:p>
@@ -2353,7 +2353,7 @@
           <a:p>
             <a:fld id="{5FAF90F6-3F8D-49C7-A37A-0A1651CD0B0C}" type="datetime1">
               <a:rPr lang="de-DE" smtClean="0"/>
-              <a:t>20.02.2013</a:t>
+              <a:t>21.02.2013</a:t>
             </a:fld>
             <a:endParaRPr lang="de-DE"/>
           </a:p>
@@ -2448,7 +2448,7 @@
           <a:p>
             <a:fld id="{95F7F587-CFED-4FD5-B3AD-083C2065DE82}" type="datetime1">
               <a:rPr lang="de-DE" smtClean="0"/>
-              <a:t>20.02.2013</a:t>
+              <a:t>21.02.2013</a:t>
             </a:fld>
             <a:endParaRPr lang="de-DE"/>
           </a:p>
@@ -2725,7 +2725,7 @@
           <a:p>
             <a:fld id="{8A4B2867-F109-4833-817E-D342D1CD7196}" type="datetime1">
               <a:rPr lang="de-DE" smtClean="0"/>
-              <a:t>20.02.2013</a:t>
+              <a:t>21.02.2013</a:t>
             </a:fld>
             <a:endParaRPr lang="de-DE"/>
           </a:p>
@@ -2982,7 +2982,7 @@
           <a:p>
             <a:fld id="{66CE27EE-5B06-4FE1-A707-B61678AF74C0}" type="datetime1">
               <a:rPr lang="de-DE" smtClean="0"/>
-              <a:t>20.02.2013</a:t>
+              <a:t>21.02.2013</a:t>
             </a:fld>
             <a:endParaRPr lang="de-DE"/>
           </a:p>
@@ -3225,7 +3225,7 @@
           <a:p>
             <a:fld id="{81FF7C9C-F712-412E-9DE7-744EF926ADAF}" type="datetime1">
               <a:rPr lang="de-DE" smtClean="0"/>
-              <a:t>20.02.2013</a:t>
+              <a:t>21.02.2013</a:t>
             </a:fld>
             <a:endParaRPr lang="de-DE" dirty="0"/>
           </a:p>
@@ -3779,6 +3779,137 @@
           </a:p>
         </p:txBody>
       </p:sp>
+      <p:sp>
+        <p:nvSpPr>
+          <p:cNvPr id="4" name="Textfeld 3"/>
+          <p:cNvSpPr txBox="1"/>
+          <p:nvPr/>
+        </p:nvSpPr>
+        <p:spPr>
+          <a:xfrm>
+            <a:off x="18215" y="5982213"/>
+            <a:ext cx="8969122" cy="369332"/>
+          </a:xfrm>
+          <a:prstGeom prst="rect">
+            <a:avLst/>
+          </a:prstGeom>
+          <a:noFill/>
+        </p:spPr>
+        <p:txBody>
+          <a:bodyPr wrap="none" rtlCol="0">
+            <a:spAutoFit/>
+          </a:bodyPr>
+          <a:lstStyle/>
+          <a:p>
+            <a:r>
+              <a:rPr lang="de-DE" sz="900" dirty="0" err="1" smtClean="0"/>
+              <a:t>DIMActor</a:t>
+            </a:r>
+            <a:r>
+              <a:rPr lang="de-DE" sz="900" dirty="0" smtClean="0"/>
+              <a:t> </a:t>
+            </a:r>
+            <a:r>
+              <a:rPr lang="de-DE" sz="900" dirty="0"/>
+              <a:t>von Dr. Holger Brand steht unter einer </a:t>
+            </a:r>
+            <a:r>
+              <a:rPr lang="de-DE" sz="900" dirty="0">
+                <a:hlinkClick r:id="rId2"/>
+              </a:rPr>
+              <a:t>Creative </a:t>
+            </a:r>
+            <a:r>
+              <a:rPr lang="de-DE" sz="900" dirty="0" err="1">
+                <a:hlinkClick r:id="rId2"/>
+              </a:rPr>
+              <a:t>Commons</a:t>
+            </a:r>
+            <a:r>
+              <a:rPr lang="de-DE" sz="900" dirty="0">
+                <a:hlinkClick r:id="rId2"/>
+              </a:rPr>
+              <a:t> Namensnennung - Nicht-kommerziell - Weitergabe unter gleichen Bedingungen 3.0 </a:t>
+            </a:r>
+            <a:r>
+              <a:rPr lang="de-DE" sz="900" dirty="0" err="1">
+                <a:hlinkClick r:id="rId2"/>
+              </a:rPr>
+              <a:t>Unported</a:t>
+            </a:r>
+            <a:r>
+              <a:rPr lang="de-DE" sz="900" dirty="0">
+                <a:hlinkClick r:id="rId2"/>
+              </a:rPr>
+              <a:t> Lizenz</a:t>
+            </a:r>
+            <a:r>
+              <a:rPr lang="de-DE" sz="900" dirty="0"/>
+              <a:t>.</a:t>
+            </a:r>
+            <a:br>
+              <a:rPr lang="de-DE" sz="900" dirty="0"/>
+            </a:br>
+            <a:r>
+              <a:rPr lang="de-DE" sz="900" dirty="0"/>
+              <a:t>Über diese Lizenz hinausgehende Erlaubnisse können Sie unter </a:t>
+            </a:r>
+            <a:r>
+              <a:rPr lang="de-DE" sz="900" dirty="0">
+                <a:hlinkClick r:id="rId3"/>
+              </a:rPr>
+              <a:t>https://www.gsi.de/work/organisation/bereiche/personalrecht/patente_und_technologietransfer.htm</a:t>
+            </a:r>
+            <a:r>
+              <a:rPr lang="de-DE" sz="900" dirty="0"/>
+              <a:t> erhalten</a:t>
+            </a:r>
+          </a:p>
+        </p:txBody>
+      </p:sp>
+      <p:pic>
+        <p:nvPicPr>
+          <p:cNvPr id="1026" name="Picture 2" descr="Creative Commons Lizenzvertrag">
+            <a:hlinkClick r:id="rId2"/>
+          </p:cNvPr>
+          <p:cNvPicPr>
+            <a:picLocks noChangeAspect="1" noChangeArrowheads="1"/>
+          </p:cNvPicPr>
+          <p:nvPr/>
+        </p:nvPicPr>
+        <p:blipFill>
+          <a:blip r:embed="rId4">
+            <a:extLst>
+              <a:ext uri="{28A0092B-C50C-407E-A947-70E740481C1C}">
+                <a14:useLocalDpi xmlns:a14="http://schemas.microsoft.com/office/drawing/2010/main" val="0"/>
+              </a:ext>
+            </a:extLst>
+          </a:blip>
+          <a:srcRect/>
+          <a:stretch>
+            <a:fillRect/>
+          </a:stretch>
+        </p:blipFill>
+        <p:spPr bwMode="auto">
+          <a:xfrm>
+            <a:off x="107504" y="5717601"/>
+            <a:ext cx="838200" cy="295275"/>
+          </a:xfrm>
+          <a:prstGeom prst="rect">
+            <a:avLst/>
+          </a:prstGeom>
+          <a:noFill/>
+          <a:extLst>
+            <a:ext uri="{909E8E84-426E-40DD-AFC4-6F175D3DCCD1}">
+              <a14:hiddenFill xmlns:a14="http://schemas.microsoft.com/office/drawing/2010/main">
+                <a:solidFill>
+                  <a:srgbClr val="FFFFFF"/>
+                </a:solidFill>
+              </a14:hiddenFill>
+            </a:ext>
+          </a:extLst>
+        </p:spPr>
+      </p:pic>
     </p:spTree>
     <p:extLst>
       <p:ext uri="{BB962C8B-B14F-4D97-AF65-F5344CB8AC3E}">
@@ -4036,7 +4167,7 @@
           <a:p>
             <a:fld id="{66514710-0C99-4DBD-B4EA-4EE375B296BE}" type="datetime1">
               <a:rPr lang="de-DE" smtClean="0"/>
-              <a:t>20.02.2013</a:t>
+              <a:t>21.02.2013</a:t>
             </a:fld>
             <a:endParaRPr lang="de-DE"/>
           </a:p>
@@ -4561,7 +4692,7 @@
           <a:p>
             <a:fld id="{0FC658A1-4302-42C8-B31D-D1430F6AE143}" type="datetime1">
               <a:rPr lang="de-DE" smtClean="0"/>
-              <a:t>20.02.2013</a:t>
+              <a:t>21.02.2013</a:t>
             </a:fld>
             <a:endParaRPr lang="de-DE"/>
           </a:p>
@@ -4697,7 +4828,7 @@
           <a:p>
             <a:fld id="{66514710-0C99-4DBD-B4EA-4EE375B296BE}" type="datetime1">
               <a:rPr lang="de-DE" smtClean="0"/>
-              <a:t>20.02.2013</a:t>
+              <a:t>21.02.2013</a:t>
             </a:fld>
             <a:endParaRPr lang="de-DE"/>
           </a:p>
@@ -5021,7 +5152,7 @@
           <a:p>
             <a:fld id="{5FAF90F6-3F8D-49C7-A37A-0A1651CD0B0C}" type="datetime1">
               <a:rPr lang="de-DE" smtClean="0"/>
-              <a:t>20.02.2013</a:t>
+              <a:t>21.02.2013</a:t>
             </a:fld>
             <a:endParaRPr lang="de-DE"/>
           </a:p>
@@ -5349,11 +5480,7 @@
           <a:p>
             <a:r>
               <a:rPr lang="en-US" dirty="0" smtClean="0"/>
-              <a:t>Dynamic </a:t>
-            </a:r>
-            <a:r>
-              <a:rPr lang="en-US" dirty="0" smtClean="0"/>
-              <a:t>Dispatch-VI:</a:t>
+              <a:t>Dynamic Dispatch-VI:</a:t>
             </a:r>
           </a:p>
           <a:p>
@@ -5512,7 +5639,7 @@
           <a:p>
             <a:fld id="{5FAF90F6-3F8D-49C7-A37A-0A1651CD0B0C}" type="datetime1">
               <a:rPr lang="de-DE" smtClean="0"/>
-              <a:t>20.02.2013</a:t>
+              <a:t>21.02.2013</a:t>
             </a:fld>
             <a:endParaRPr lang="de-DE"/>
           </a:p>
@@ -5981,7 +6108,7 @@
           <a:p>
             <a:fld id="{5FAF90F6-3F8D-49C7-A37A-0A1651CD0B0C}" type="datetime1">
               <a:rPr lang="de-DE" smtClean="0"/>
-              <a:t>20.02.2013</a:t>
+              <a:t>21.02.2013</a:t>
             </a:fld>
             <a:endParaRPr lang="de-DE"/>
           </a:p>
@@ -6510,7 +6637,7 @@
           <a:p>
             <a:fld id="{5FAF90F6-3F8D-49C7-A37A-0A1651CD0B0C}" type="datetime1">
               <a:rPr lang="de-DE" smtClean="0"/>
-              <a:t>20.02.2013</a:t>
+              <a:t>21.02.2013</a:t>
             </a:fld>
             <a:endParaRPr lang="de-DE"/>
           </a:p>
@@ -7100,7 +7227,7 @@
           <a:p>
             <a:fld id="{5FAF90F6-3F8D-49C7-A37A-0A1651CD0B0C}" type="datetime1">
               <a:rPr lang="de-DE" smtClean="0"/>
-              <a:t>20.02.2013</a:t>
+              <a:t>21.02.2013</a:t>
             </a:fld>
             <a:endParaRPr lang="de-DE"/>
           </a:p>
@@ -8205,7 +8332,6 @@
               <a:rPr lang="en-US" dirty="0" smtClean="0"/>
               <a:t>-Objects</a:t>
             </a:r>
-            <a:endParaRPr lang="en-US" dirty="0" smtClean="0"/>
           </a:p>
           <a:p>
             <a:endParaRPr lang="en-US" dirty="0"/>
@@ -8229,7 +8355,7 @@
           <a:p>
             <a:fld id="{5FAF90F6-3F8D-49C7-A37A-0A1651CD0B0C}" type="datetime1">
               <a:rPr lang="de-DE" smtClean="0"/>
-              <a:t>20.02.2013</a:t>
+              <a:t>21.02.2013</a:t>
             </a:fld>
             <a:endParaRPr lang="de-DE"/>
           </a:p>
@@ -8600,7 +8726,7 @@
           <a:p>
             <a:fld id="{66514710-0C99-4DBD-B4EA-4EE375B296BE}" type="datetime1">
               <a:rPr lang="de-DE" smtClean="0"/>
-              <a:t>20.02.2013</a:t>
+              <a:t>21.02.2013</a:t>
             </a:fld>
             <a:endParaRPr lang="de-DE"/>
           </a:p>
@@ -8895,7 +9021,7 @@
           <a:p>
             <a:fld id="{0FC658A1-4302-42C8-B31D-D1430F6AE143}" type="datetime1">
               <a:rPr lang="de-DE" smtClean="0"/>
-              <a:t>20.02.2013</a:t>
+              <a:t>21.02.2013</a:t>
             </a:fld>
             <a:endParaRPr lang="de-DE"/>
           </a:p>
@@ -8916,7 +9042,7 @@
           <a:bodyPr/>
           <a:lstStyle/>
           <a:p>
-            <a:endParaRPr lang="de-DE"/>
+            <a:endParaRPr lang="de-DE" dirty="0"/>
           </a:p>
         </p:txBody>
       </p:sp>
@@ -9121,7 +9247,7 @@
           <a:p>
             <a:fld id="{0FC658A1-4302-42C8-B31D-D1430F6AE143}" type="datetime1">
               <a:rPr lang="de-DE" smtClean="0"/>
-              <a:t>20.02.2013</a:t>
+              <a:t>21.02.2013</a:t>
             </a:fld>
             <a:endParaRPr lang="de-DE"/>
           </a:p>
@@ -9423,7 +9549,7 @@
           <a:p>
             <a:fld id="{0FC658A1-4302-42C8-B31D-D1430F6AE143}" type="datetime1">
               <a:rPr lang="de-DE" smtClean="0"/>
-              <a:t>20.02.2013</a:t>
+              <a:t>21.02.2013</a:t>
             </a:fld>
             <a:endParaRPr lang="de-DE"/>
           </a:p>
@@ -9750,7 +9876,7 @@
           <a:p>
             <a:fld id="{0FC658A1-4302-42C8-B31D-D1430F6AE143}" type="datetime1">
               <a:rPr lang="de-DE" smtClean="0"/>
-              <a:t>20.02.2013</a:t>
+              <a:t>21.02.2013</a:t>
             </a:fld>
             <a:endParaRPr lang="de-DE"/>
           </a:p>
@@ -10098,7 +10224,7 @@
           <a:p>
             <a:fld id="{0FC658A1-4302-42C8-B31D-D1430F6AE143}" type="datetime1">
               <a:rPr lang="de-DE" smtClean="0"/>
-              <a:t>20.02.2013</a:t>
+              <a:t>21.02.2013</a:t>
             </a:fld>
             <a:endParaRPr lang="de-DE"/>
           </a:p>
@@ -10746,7 +10872,7 @@
           <a:p>
             <a:fld id="{0FC658A1-4302-42C8-B31D-D1430F6AE143}" type="datetime1">
               <a:rPr lang="de-DE" smtClean="0"/>
-              <a:t>20.02.2013</a:t>
+              <a:t>21.02.2013</a:t>
             </a:fld>
             <a:endParaRPr lang="de-DE"/>
           </a:p>
@@ -11015,7 +11141,7 @@
         </p:nvSpPr>
         <p:spPr>
           <a:xfrm>
-            <a:off x="457200" y="1600201"/>
+            <a:off x="457200" y="1196752"/>
             <a:ext cx="4038600" cy="3412976"/>
           </a:xfrm>
         </p:spPr>
@@ -11110,7 +11236,7 @@
         </p:nvSpPr>
         <p:spPr>
           <a:xfrm>
-            <a:off x="4648200" y="1600201"/>
+            <a:off x="4648200" y="1196752"/>
             <a:ext cx="4388296" cy="3629000"/>
           </a:xfrm>
         </p:spPr>
@@ -11198,7 +11324,7 @@
           <a:p>
             <a:fld id="{0FC658A1-4302-42C8-B31D-D1430F6AE143}" type="datetime1">
               <a:rPr lang="de-DE" smtClean="0"/>
-              <a:t>20.02.2013</a:t>
+              <a:t>21.02.2013</a:t>
             </a:fld>
             <a:endParaRPr lang="de-DE"/>
           </a:p>
@@ -11219,7 +11345,7 @@
           <a:bodyPr/>
           <a:lstStyle/>
           <a:p>
-            <a:endParaRPr lang="de-DE"/>
+            <a:endParaRPr lang="de-DE" dirty="0"/>
           </a:p>
         </p:txBody>
       </p:sp>
@@ -11269,7 +11395,7 @@
         </p:blipFill>
         <p:spPr bwMode="auto">
           <a:xfrm>
-            <a:off x="5035806" y="4077072"/>
+            <a:off x="5035806" y="3645024"/>
             <a:ext cx="2272498" cy="2204864"/>
           </a:xfrm>
           <a:prstGeom prst="rect">
@@ -11310,7 +11436,7 @@
         </p:blipFill>
         <p:spPr bwMode="auto">
           <a:xfrm>
-            <a:off x="827584" y="4581128"/>
+            <a:off x="827584" y="4077072"/>
             <a:ext cx="3067050" cy="1162050"/>
           </a:xfrm>
           <a:prstGeom prst="rect">
@@ -11328,6 +11454,110 @@
           </a:extLst>
         </p:spPr>
       </p:pic>
+      <p:sp>
+        <p:nvSpPr>
+          <p:cNvPr id="3" name="Textfeld 2"/>
+          <p:cNvSpPr txBox="1"/>
+          <p:nvPr/>
+        </p:nvSpPr>
+        <p:spPr>
+          <a:xfrm>
+            <a:off x="755576" y="5940569"/>
+            <a:ext cx="6542560" cy="584775"/>
+          </a:xfrm>
+          <a:prstGeom prst="rect">
+            <a:avLst/>
+          </a:prstGeom>
+          <a:noFill/>
+        </p:spPr>
+        <p:txBody>
+          <a:bodyPr wrap="none" rtlCol="0">
+            <a:spAutoFit/>
+          </a:bodyPr>
+          <a:lstStyle/>
+          <a:p>
+            <a:r>
+              <a:rPr lang="de-DE" sz="1600" i="1" dirty="0" err="1" smtClean="0"/>
+              <a:t>Linked</a:t>
+            </a:r>
+            <a:r>
+              <a:rPr lang="de-DE" sz="1600" i="1" dirty="0" smtClean="0"/>
+              <a:t> Network </a:t>
+            </a:r>
+            <a:r>
+              <a:rPr lang="de-DE" sz="1600" i="1" dirty="0" err="1" smtClean="0"/>
+              <a:t>Actor</a:t>
+            </a:r>
+            <a:r>
+              <a:rPr lang="de-DE" sz="1600" dirty="0"/>
+              <a:t>: </a:t>
+            </a:r>
+            <a:r>
+              <a:rPr lang="de-DE" sz="1600" dirty="0">
+                <a:hlinkClick r:id="rId4"/>
+              </a:rPr>
+              <a:t>https://</a:t>
+            </a:r>
+            <a:r>
+              <a:rPr lang="de-DE" sz="1600" dirty="0" smtClean="0">
+                <a:hlinkClick r:id="rId4"/>
+              </a:rPr>
+              <a:t>decibel.ni.com/content/docs/DOC-24051</a:t>
+            </a:r>
+            <a:endParaRPr lang="de-DE" sz="1600" dirty="0" smtClean="0"/>
+          </a:p>
+          <a:p>
+            <a:r>
+              <a:rPr lang="de-DE" sz="1600" dirty="0" err="1" smtClean="0"/>
+              <a:t>is</a:t>
+            </a:r>
+            <a:r>
+              <a:rPr lang="de-DE" sz="1600" dirty="0" smtClean="0"/>
+              <a:t> </a:t>
+            </a:r>
+            <a:r>
+              <a:rPr lang="de-DE" sz="1600" dirty="0" err="1" smtClean="0"/>
+              <a:t>using</a:t>
+            </a:r>
+            <a:r>
+              <a:rPr lang="de-DE" sz="1600" dirty="0" smtClean="0"/>
+              <a:t> a </a:t>
+            </a:r>
+            <a:r>
+              <a:rPr lang="de-DE" sz="1600" dirty="0" err="1" smtClean="0"/>
+              <a:t>nested</a:t>
+            </a:r>
+            <a:r>
+              <a:rPr lang="de-DE" sz="1600" dirty="0" smtClean="0"/>
+              <a:t> </a:t>
+            </a:r>
+            <a:r>
+              <a:rPr lang="de-DE" sz="1600" dirty="0" err="1" smtClean="0"/>
+              <a:t>actor</a:t>
+            </a:r>
+            <a:r>
+              <a:rPr lang="de-DE" sz="1600" dirty="0" smtClean="0"/>
+              <a:t> </a:t>
+            </a:r>
+            <a:r>
+              <a:rPr lang="de-DE" sz="1600" dirty="0" err="1" smtClean="0"/>
+              <a:t>maintaining</a:t>
+            </a:r>
+            <a:r>
+              <a:rPr lang="de-DE" sz="1600" dirty="0" smtClean="0"/>
+              <a:t> </a:t>
+            </a:r>
+            <a:r>
+              <a:rPr lang="de-DE" sz="1600" dirty="0" err="1" smtClean="0"/>
+              <a:t>networkstreams</a:t>
+            </a:r>
+            <a:r>
+              <a:rPr lang="de-DE" sz="1600" dirty="0" smtClean="0"/>
+              <a:t>.</a:t>
+            </a:r>
+          </a:p>
+        </p:txBody>
+      </p:sp>
     </p:spTree>
     <p:extLst>
       <p:ext uri="{BB962C8B-B14F-4D97-AF65-F5344CB8AC3E}">
@@ -11546,7 +11776,7 @@
           <a:p>
             <a:fld id="{66514710-0C99-4DBD-B4EA-4EE375B296BE}" type="datetime1">
               <a:rPr lang="de-DE" smtClean="0"/>
-              <a:t>20.02.2013</a:t>
+              <a:t>21.02.2013</a:t>
             </a:fld>
             <a:endParaRPr lang="de-DE"/>
           </a:p>

</xml_diff>

<commit_message>
Add hint to used nested DIMActors.
</commit_message>
<xml_diff>
--- a/Documentation/NI Actor Framework -DIMActor.pptx
+++ b/Documentation/NI Actor Framework -DIMActor.pptx
@@ -210,7 +210,7 @@
           <a:p>
             <a:fld id="{BAB46D27-B0DF-4E98-85C6-8BD5834E4FC4}" type="datetimeFigureOut">
               <a:rPr lang="de-DE" smtClean="0"/>
-              <a:t>21.02.2013</a:t>
+              <a:t>12.03.2013</a:t>
             </a:fld>
             <a:endParaRPr lang="de-DE"/>
           </a:p>
@@ -705,7 +705,7 @@
             <a:fld id="{B418CCE3-ADF8-4D6E-B263-90E85820EC44}" type="datetime1">
               <a:rPr lang="de-DE" smtClean="0"/>
               <a:pPr/>
-              <a:t>21.02.2013</a:t>
+              <a:t>12.03.2013</a:t>
             </a:fld>
             <a:endParaRPr lang="de-DE" dirty="0"/>
           </a:p>
@@ -901,7 +901,7 @@
           <a:p>
             <a:fld id="{BB834E4F-0125-4AD2-8584-167B6DA5606F}" type="datetime1">
               <a:rPr lang="de-DE" smtClean="0"/>
-              <a:t>21.02.2013</a:t>
+              <a:t>12.03.2013</a:t>
             </a:fld>
             <a:endParaRPr lang="de-DE"/>
           </a:p>
@@ -1081,7 +1081,7 @@
           <a:p>
             <a:fld id="{91968600-0E23-484E-9747-10E22BA18989}" type="datetime1">
               <a:rPr lang="de-DE" smtClean="0"/>
-              <a:t>21.02.2013</a:t>
+              <a:t>12.03.2013</a:t>
             </a:fld>
             <a:endParaRPr lang="de-DE"/>
           </a:p>
@@ -1272,7 +1272,7 @@
           <a:p>
             <a:fld id="{0FC658A1-4302-42C8-B31D-D1430F6AE143}" type="datetime1">
               <a:rPr lang="de-DE" smtClean="0"/>
-              <a:t>21.02.2013</a:t>
+              <a:t>12.03.2013</a:t>
             </a:fld>
             <a:endParaRPr lang="de-DE"/>
           </a:p>
@@ -1525,7 +1525,7 @@
           <a:p>
             <a:fld id="{1B6924CB-05FB-4179-B2D0-92DB10EA4650}" type="datetime1">
               <a:rPr lang="de-DE" smtClean="0"/>
-              <a:t>21.02.2013</a:t>
+              <a:t>12.03.2013</a:t>
             </a:fld>
             <a:endParaRPr lang="de-DE"/>
           </a:p>
@@ -1813,7 +1813,7 @@
           <a:p>
             <a:fld id="{66514710-0C99-4DBD-B4EA-4EE375B296BE}" type="datetime1">
               <a:rPr lang="de-DE" smtClean="0"/>
-              <a:t>21.02.2013</a:t>
+              <a:t>12.03.2013</a:t>
             </a:fld>
             <a:endParaRPr lang="de-DE"/>
           </a:p>
@@ -2235,7 +2235,7 @@
           <a:p>
             <a:fld id="{D5C6EF29-F2FB-47AB-A486-8D1D28D3E553}" type="datetime1">
               <a:rPr lang="de-DE" smtClean="0"/>
-              <a:t>21.02.2013</a:t>
+              <a:t>12.03.2013</a:t>
             </a:fld>
             <a:endParaRPr lang="de-DE"/>
           </a:p>
@@ -2353,7 +2353,7 @@
           <a:p>
             <a:fld id="{5FAF90F6-3F8D-49C7-A37A-0A1651CD0B0C}" type="datetime1">
               <a:rPr lang="de-DE" smtClean="0"/>
-              <a:t>21.02.2013</a:t>
+              <a:t>12.03.2013</a:t>
             </a:fld>
             <a:endParaRPr lang="de-DE"/>
           </a:p>
@@ -2448,7 +2448,7 @@
           <a:p>
             <a:fld id="{95F7F587-CFED-4FD5-B3AD-083C2065DE82}" type="datetime1">
               <a:rPr lang="de-DE" smtClean="0"/>
-              <a:t>21.02.2013</a:t>
+              <a:t>12.03.2013</a:t>
             </a:fld>
             <a:endParaRPr lang="de-DE"/>
           </a:p>
@@ -2725,7 +2725,7 @@
           <a:p>
             <a:fld id="{8A4B2867-F109-4833-817E-D342D1CD7196}" type="datetime1">
               <a:rPr lang="de-DE" smtClean="0"/>
-              <a:t>21.02.2013</a:t>
+              <a:t>12.03.2013</a:t>
             </a:fld>
             <a:endParaRPr lang="de-DE"/>
           </a:p>
@@ -2982,7 +2982,7 @@
           <a:p>
             <a:fld id="{66CE27EE-5B06-4FE1-A707-B61678AF74C0}" type="datetime1">
               <a:rPr lang="de-DE" smtClean="0"/>
-              <a:t>21.02.2013</a:t>
+              <a:t>12.03.2013</a:t>
             </a:fld>
             <a:endParaRPr lang="de-DE"/>
           </a:p>
@@ -3225,7 +3225,7 @@
           <a:p>
             <a:fld id="{81FF7C9C-F712-412E-9DE7-744EF926ADAF}" type="datetime1">
               <a:rPr lang="de-DE" smtClean="0"/>
-              <a:t>21.02.2013</a:t>
+              <a:t>12.03.2013</a:t>
             </a:fld>
             <a:endParaRPr lang="de-DE" dirty="0"/>
           </a:p>
@@ -4167,7 +4167,7 @@
           <a:p>
             <a:fld id="{66514710-0C99-4DBD-B4EA-4EE375B296BE}" type="datetime1">
               <a:rPr lang="de-DE" smtClean="0"/>
-              <a:t>21.02.2013</a:t>
+              <a:t>12.03.2013</a:t>
             </a:fld>
             <a:endParaRPr lang="de-DE"/>
           </a:p>
@@ -4692,7 +4692,7 @@
           <a:p>
             <a:fld id="{0FC658A1-4302-42C8-B31D-D1430F6AE143}" type="datetime1">
               <a:rPr lang="de-DE" smtClean="0"/>
-              <a:t>21.02.2013</a:t>
+              <a:t>12.03.2013</a:t>
             </a:fld>
             <a:endParaRPr lang="de-DE"/>
           </a:p>
@@ -4828,7 +4828,7 @@
           <a:p>
             <a:fld id="{66514710-0C99-4DBD-B4EA-4EE375B296BE}" type="datetime1">
               <a:rPr lang="de-DE" smtClean="0"/>
-              <a:t>21.02.2013</a:t>
+              <a:t>12.03.2013</a:t>
             </a:fld>
             <a:endParaRPr lang="de-DE"/>
           </a:p>
@@ -5152,7 +5152,7 @@
           <a:p>
             <a:fld id="{5FAF90F6-3F8D-49C7-A37A-0A1651CD0B0C}" type="datetime1">
               <a:rPr lang="de-DE" smtClean="0"/>
-              <a:t>21.02.2013</a:t>
+              <a:t>12.03.2013</a:t>
             </a:fld>
             <a:endParaRPr lang="de-DE"/>
           </a:p>
@@ -5639,7 +5639,7 @@
           <a:p>
             <a:fld id="{5FAF90F6-3F8D-49C7-A37A-0A1651CD0B0C}" type="datetime1">
               <a:rPr lang="de-DE" smtClean="0"/>
-              <a:t>21.02.2013</a:t>
+              <a:t>12.03.2013</a:t>
             </a:fld>
             <a:endParaRPr lang="de-DE"/>
           </a:p>
@@ -6108,7 +6108,7 @@
           <a:p>
             <a:fld id="{5FAF90F6-3F8D-49C7-A37A-0A1651CD0B0C}" type="datetime1">
               <a:rPr lang="de-DE" smtClean="0"/>
-              <a:t>21.02.2013</a:t>
+              <a:t>12.03.2013</a:t>
             </a:fld>
             <a:endParaRPr lang="de-DE"/>
           </a:p>
@@ -6637,7 +6637,7 @@
           <a:p>
             <a:fld id="{5FAF90F6-3F8D-49C7-A37A-0A1651CD0B0C}" type="datetime1">
               <a:rPr lang="de-DE" smtClean="0"/>
-              <a:t>21.02.2013</a:t>
+              <a:t>12.03.2013</a:t>
             </a:fld>
             <a:endParaRPr lang="de-DE"/>
           </a:p>
@@ -7227,7 +7227,7 @@
           <a:p>
             <a:fld id="{5FAF90F6-3F8D-49C7-A37A-0A1651CD0B0C}" type="datetime1">
               <a:rPr lang="de-DE" smtClean="0"/>
-              <a:t>21.02.2013</a:t>
+              <a:t>12.03.2013</a:t>
             </a:fld>
             <a:endParaRPr lang="de-DE"/>
           </a:p>
@@ -8019,7 +8019,7 @@
         </p:blipFill>
         <p:spPr bwMode="auto">
           <a:xfrm>
-            <a:off x="6300192" y="3284984"/>
+            <a:off x="6300192" y="3423893"/>
             <a:ext cx="2839789" cy="941211"/>
           </a:xfrm>
           <a:prstGeom prst="rect">
@@ -8140,12 +8140,12 @@
         <p:spPr>
           <a:xfrm>
             <a:off x="223283" y="1340768"/>
-            <a:ext cx="8237149" cy="4932441"/>
+            <a:ext cx="8525181" cy="4932441"/>
           </a:xfrm>
         </p:spPr>
         <p:txBody>
           <a:bodyPr>
-            <a:normAutofit/>
+            <a:normAutofit fontScale="92500"/>
           </a:bodyPr>
           <a:lstStyle/>
           <a:p>
@@ -8172,6 +8172,25 @@
             <a:endParaRPr lang="en-US" i="1" dirty="0" smtClean="0"/>
           </a:p>
           <a:p>
+            <a:pPr marL="800100" lvl="1" indent="-342900">
+              <a:buFont typeface="Arial" pitchFamily="34" charset="0"/>
+              <a:buChar char="•"/>
+            </a:pPr>
+            <a:r>
+              <a:rPr lang="en-US" i="1" dirty="0" smtClean="0"/>
+              <a:t>or create a new derived </a:t>
+            </a:r>
+            <a:r>
+              <a:rPr lang="en-US" i="1" dirty="0" err="1" smtClean="0"/>
+              <a:t>DIMActor</a:t>
+            </a:r>
+            <a:r>
+              <a:rPr lang="en-US" i="1" dirty="0" smtClean="0"/>
+              <a:t> class to be used as nested Actor.</a:t>
+            </a:r>
+            <a:endParaRPr lang="en-US" i="1" dirty="0" smtClean="0"/>
+          </a:p>
+          <a:p>
             <a:pPr marL="342900" indent="-342900">
               <a:buFont typeface="Arial" pitchFamily="34" charset="0"/>
               <a:buChar char="•"/>
@@ -8272,8 +8291,25 @@
             </a:pPr>
             <a:r>
               <a:rPr lang="en-US" dirty="0" smtClean="0"/>
-              <a:t>Send corresponding (already existing) Message to self.</a:t>
-            </a:r>
+              <a:t>Send corresponding (already existing) Message to </a:t>
+            </a:r>
+            <a:r>
+              <a:rPr lang="en-US" i="1" dirty="0" smtClean="0"/>
+              <a:t>self</a:t>
+            </a:r>
+            <a:r>
+              <a:rPr lang="en-US" dirty="0" smtClean="0"/>
+              <a:t> or </a:t>
+            </a:r>
+            <a:r>
+              <a:rPr lang="en-US" i="1" dirty="0" smtClean="0"/>
+              <a:t>owner</a:t>
+            </a:r>
+            <a:r>
+              <a:rPr lang="en-US" dirty="0" smtClean="0"/>
+              <a:t> if nested.</a:t>
+            </a:r>
+            <a:endParaRPr lang="en-US" dirty="0" smtClean="0"/>
           </a:p>
           <a:p>
             <a:pPr marL="342900" indent="-342900">
@@ -8294,10 +8330,22 @@
             </a:r>
           </a:p>
           <a:p>
-            <a:pPr marL="342900" indent="-342900">
-              <a:buFont typeface="Arial" pitchFamily="34" charset="0"/>
-              <a:buChar char="•"/>
-            </a:pPr>
+            <a:pPr marL="800100" lvl="1" indent="-342900">
+              <a:buFont typeface="Arial" pitchFamily="34" charset="0"/>
+              <a:buChar char="•"/>
+            </a:pPr>
+            <a:r>
+              <a:rPr lang="en-US" dirty="0" smtClean="0"/>
+              <a:t>or send Messages to</a:t>
+            </a:r>
+            <a:r>
+              <a:rPr lang="en-US" dirty="0" smtClean="0"/>
+              <a:t> nested </a:t>
+            </a:r>
+            <a:r>
+              <a:rPr lang="en-US" dirty="0" err="1" smtClean="0"/>
+              <a:t>DIMActor</a:t>
+            </a:r>
             <a:endParaRPr lang="en-US" dirty="0" smtClean="0"/>
           </a:p>
           <a:p>
@@ -8355,7 +8403,7 @@
           <a:p>
             <a:fld id="{5FAF90F6-3F8D-49C7-A37A-0A1651CD0B0C}" type="datetime1">
               <a:rPr lang="de-DE" smtClean="0"/>
-              <a:t>21.02.2013</a:t>
+              <a:t>12.03.2013</a:t>
             </a:fld>
             <a:endParaRPr lang="de-DE"/>
           </a:p>
@@ -8426,7 +8474,7 @@
         </p:blipFill>
         <p:spPr bwMode="auto">
           <a:xfrm>
-            <a:off x="5666336" y="4725144"/>
+            <a:off x="5666336" y="4911176"/>
             <a:ext cx="3442168" cy="966096"/>
           </a:xfrm>
           <a:prstGeom prst="rect">
@@ -8726,7 +8774,7 @@
           <a:p>
             <a:fld id="{66514710-0C99-4DBD-B4EA-4EE375B296BE}" type="datetime1">
               <a:rPr lang="de-DE" smtClean="0"/>
-              <a:t>21.02.2013</a:t>
+              <a:t>12.03.2013</a:t>
             </a:fld>
             <a:endParaRPr lang="de-DE"/>
           </a:p>
@@ -9021,7 +9069,7 @@
           <a:p>
             <a:fld id="{0FC658A1-4302-42C8-B31D-D1430F6AE143}" type="datetime1">
               <a:rPr lang="de-DE" smtClean="0"/>
-              <a:t>21.02.2013</a:t>
+              <a:t>12.03.2013</a:t>
             </a:fld>
             <a:endParaRPr lang="de-DE"/>
           </a:p>
@@ -9247,7 +9295,7 @@
           <a:p>
             <a:fld id="{0FC658A1-4302-42C8-B31D-D1430F6AE143}" type="datetime1">
               <a:rPr lang="de-DE" smtClean="0"/>
-              <a:t>21.02.2013</a:t>
+              <a:t>12.03.2013</a:t>
             </a:fld>
             <a:endParaRPr lang="de-DE"/>
           </a:p>
@@ -9549,7 +9597,7 @@
           <a:p>
             <a:fld id="{0FC658A1-4302-42C8-B31D-D1430F6AE143}" type="datetime1">
               <a:rPr lang="de-DE" smtClean="0"/>
-              <a:t>21.02.2013</a:t>
+              <a:t>12.03.2013</a:t>
             </a:fld>
             <a:endParaRPr lang="de-DE"/>
           </a:p>
@@ -9876,7 +9924,7 @@
           <a:p>
             <a:fld id="{0FC658A1-4302-42C8-B31D-D1430F6AE143}" type="datetime1">
               <a:rPr lang="de-DE" smtClean="0"/>
-              <a:t>21.02.2013</a:t>
+              <a:t>12.03.2013</a:t>
             </a:fld>
             <a:endParaRPr lang="de-DE"/>
           </a:p>
@@ -10224,7 +10272,7 @@
           <a:p>
             <a:fld id="{0FC658A1-4302-42C8-B31D-D1430F6AE143}" type="datetime1">
               <a:rPr lang="de-DE" smtClean="0"/>
-              <a:t>21.02.2013</a:t>
+              <a:t>12.03.2013</a:t>
             </a:fld>
             <a:endParaRPr lang="de-DE"/>
           </a:p>
@@ -10872,7 +10920,7 @@
           <a:p>
             <a:fld id="{0FC658A1-4302-42C8-B31D-D1430F6AE143}" type="datetime1">
               <a:rPr lang="de-DE" smtClean="0"/>
-              <a:t>21.02.2013</a:t>
+              <a:t>12.03.2013</a:t>
             </a:fld>
             <a:endParaRPr lang="de-DE"/>
           </a:p>
@@ -11324,7 +11372,7 @@
           <a:p>
             <a:fld id="{0FC658A1-4302-42C8-B31D-D1430F6AE143}" type="datetime1">
               <a:rPr lang="de-DE" smtClean="0"/>
-              <a:t>21.02.2013</a:t>
+              <a:t>12.03.2013</a:t>
             </a:fld>
             <a:endParaRPr lang="de-DE"/>
           </a:p>
@@ -11776,7 +11824,7 @@
           <a:p>
             <a:fld id="{66514710-0C99-4DBD-B4EA-4EE375B296BE}" type="datetime1">
               <a:rPr lang="de-DE" smtClean="0"/>
-              <a:t>21.02.2013</a:t>
+              <a:t>12.03.2013</a:t>
             </a:fld>
             <a:endParaRPr lang="de-DE"/>
           </a:p>

</xml_diff>